<commit_message>
Definite viste dell'interfaccia grafica; alcune abbozzate; aggiunte icone grafiche
</commit_message>
<xml_diff>
--- a/2 Storyboards/Storyboard - Add dish.pptx
+++ b/2 Storyboards/Storyboard - Add dish.pptx
@@ -2524,7 +2524,31 @@
                 </a:schemeClr>
               </a:solidFill>
             </a:rPr>
-            <a:t>Cereali contenenti glutine</a:t>
+            <a:t>Cereali contenenti glutine </a:t>
+          </a:r>
+          <a:r>
+            <a:rPr lang="it-IT" sz="1200">
+              <a:solidFill>
+                <a:schemeClr val="dk1">
+                  <a:hueOff val="0"/>
+                  <a:satOff val="0"/>
+                  <a:lumOff val="0"/>
+                </a:schemeClr>
+              </a:solidFill>
+            </a:rPr>
+            <a:t>e prodotti </a:t>
+          </a:r>
+          <a:r>
+            <a:rPr lang="it-IT" sz="1200" dirty="0">
+              <a:solidFill>
+                <a:schemeClr val="dk1">
+                  <a:hueOff val="0"/>
+                  <a:satOff val="0"/>
+                  <a:lumOff val="0"/>
+                </a:schemeClr>
+              </a:solidFill>
+            </a:rPr>
+            <a:t>derivati</a:t>
           </a:r>
         </a:p>
       </dgm:t>
@@ -3657,7 +3681,7 @@
       <dsp:spPr>
         <a:xfrm>
           <a:off x="0" y="0"/>
-          <a:ext cx="3088720" cy="256803"/>
+          <a:ext cx="3088720" cy="257114"/>
         </a:xfrm>
         <a:prstGeom prst="roundRect">
           <a:avLst/>
@@ -3732,8 +3756,8 @@
         </a:p>
       </dsp:txBody>
       <dsp:txXfrm>
-        <a:off x="12536" y="12536"/>
-        <a:ext cx="3063648" cy="231731"/>
+        <a:off x="12551" y="12551"/>
+        <a:ext cx="3063618" cy="232012"/>
       </dsp:txXfrm>
     </dsp:sp>
     <dsp:sp modelId="{588B54E1-05A8-4440-8F0D-96AD752098A3}">
@@ -3743,8 +3767,8 @@
       </dsp:nvSpPr>
       <dsp:spPr>
         <a:xfrm>
-          <a:off x="0" y="271646"/>
-          <a:ext cx="3088720" cy="256803"/>
+          <a:off x="0" y="271895"/>
+          <a:ext cx="3088720" cy="257114"/>
         </a:xfrm>
         <a:prstGeom prst="roundRect">
           <a:avLst/>
@@ -3811,8 +3835,8 @@
         </a:p>
       </dsp:txBody>
       <dsp:txXfrm>
-        <a:off x="12536" y="284182"/>
-        <a:ext cx="3063648" cy="231731"/>
+        <a:off x="12551" y="284446"/>
+        <a:ext cx="3063618" cy="232012"/>
       </dsp:txXfrm>
     </dsp:sp>
     <dsp:sp modelId="{920EF786-34AE-4CDF-83CF-7A159AE4B3C9}">
@@ -3822,8 +3846,8 @@
       </dsp:nvSpPr>
       <dsp:spPr>
         <a:xfrm>
-          <a:off x="0" y="541164"/>
-          <a:ext cx="3088720" cy="256803"/>
+          <a:off x="0" y="541668"/>
+          <a:ext cx="3088720" cy="257114"/>
         </a:xfrm>
         <a:prstGeom prst="roundRect">
           <a:avLst/>
@@ -3890,8 +3914,8 @@
         </a:p>
       </dsp:txBody>
       <dsp:txXfrm>
-        <a:off x="12536" y="553700"/>
-        <a:ext cx="3063648" cy="231731"/>
+        <a:off x="12551" y="554219"/>
+        <a:ext cx="3063618" cy="232012"/>
       </dsp:txXfrm>
     </dsp:sp>
     <dsp:sp modelId="{60CFC448-A2E9-471D-B823-5CCB0A6A8936}">
@@ -3901,8 +3925,8 @@
       </dsp:nvSpPr>
       <dsp:spPr>
         <a:xfrm>
-          <a:off x="0" y="810681"/>
-          <a:ext cx="3088720" cy="256803"/>
+          <a:off x="0" y="811440"/>
+          <a:ext cx="3088720" cy="257114"/>
         </a:xfrm>
         <a:prstGeom prst="roundRect">
           <a:avLst/>
@@ -3969,8 +3993,8 @@
         </a:p>
       </dsp:txBody>
       <dsp:txXfrm>
-        <a:off x="12536" y="823217"/>
-        <a:ext cx="3063648" cy="231731"/>
+        <a:off x="12551" y="823991"/>
+        <a:ext cx="3063618" cy="232012"/>
       </dsp:txXfrm>
     </dsp:sp>
     <dsp:sp modelId="{99CE9A2F-1CEC-4ABF-B168-15D47293304F}">
@@ -3980,8 +4004,8 @@
       </dsp:nvSpPr>
       <dsp:spPr>
         <a:xfrm>
-          <a:off x="0" y="1080198"/>
-          <a:ext cx="3088720" cy="256803"/>
+          <a:off x="0" y="1081212"/>
+          <a:ext cx="3088720" cy="257114"/>
         </a:xfrm>
         <a:prstGeom prst="roundRect">
           <a:avLst/>
@@ -4048,8 +4072,8 @@
         </a:p>
       </dsp:txBody>
       <dsp:txXfrm>
-        <a:off x="12536" y="1092734"/>
-        <a:ext cx="3063648" cy="231731"/>
+        <a:off x="12551" y="1093763"/>
+        <a:ext cx="3063618" cy="232012"/>
       </dsp:txXfrm>
     </dsp:sp>
     <dsp:sp modelId="{EFDFAC03-7954-429E-A62B-58C691FD5CEA}">
@@ -4059,8 +4083,8 @@
       </dsp:nvSpPr>
       <dsp:spPr>
         <a:xfrm>
-          <a:off x="0" y="1349715"/>
-          <a:ext cx="3088720" cy="256803"/>
+          <a:off x="0" y="1350985"/>
+          <a:ext cx="3088720" cy="257114"/>
         </a:xfrm>
         <a:prstGeom prst="roundRect">
           <a:avLst/>
@@ -4127,8 +4151,8 @@
         </a:p>
       </dsp:txBody>
       <dsp:txXfrm>
-        <a:off x="12536" y="1362251"/>
-        <a:ext cx="3063648" cy="231731"/>
+        <a:off x="12551" y="1363536"/>
+        <a:ext cx="3063618" cy="232012"/>
       </dsp:txXfrm>
     </dsp:sp>
     <dsp:sp modelId="{6A65C1F9-B100-46A8-9C4E-C0AD1F6897D8}">
@@ -4138,8 +4162,8 @@
       </dsp:nvSpPr>
       <dsp:spPr>
         <a:xfrm>
-          <a:off x="0" y="1606519"/>
-          <a:ext cx="3088720" cy="484329"/>
+          <a:off x="0" y="1608099"/>
+          <a:ext cx="3088720" cy="482188"/>
         </a:xfrm>
         <a:prstGeom prst="rect">
           <a:avLst/>
@@ -4289,8 +4313,8 @@
         </a:p>
       </dsp:txBody>
       <dsp:txXfrm>
-        <a:off x="0" y="1606519"/>
-        <a:ext cx="3088720" cy="484329"/>
+        <a:off x="0" y="1608099"/>
+        <a:ext cx="3088720" cy="482188"/>
       </dsp:txXfrm>
     </dsp:sp>
     <dsp:sp modelId="{924A46D7-53D3-4C2B-A0D4-9593D2A096BF}">
@@ -4300,8 +4324,8 @@
       </dsp:nvSpPr>
       <dsp:spPr>
         <a:xfrm>
-          <a:off x="0" y="2090848"/>
-          <a:ext cx="3088720" cy="256803"/>
+          <a:off x="0" y="2090287"/>
+          <a:ext cx="3088720" cy="257114"/>
         </a:xfrm>
         <a:prstGeom prst="roundRect">
           <a:avLst/>
@@ -4350,8 +4374,8 @@
         </a:p>
       </dsp:txBody>
       <dsp:txXfrm>
-        <a:off x="12536" y="2103384"/>
-        <a:ext cx="3063648" cy="231731"/>
+        <a:off x="12551" y="2102838"/>
+        <a:ext cx="3063618" cy="232012"/>
       </dsp:txXfrm>
     </dsp:sp>
     <dsp:sp modelId="{A04F6C91-AEBF-4847-980F-C23A5906DCBB}">
@@ -4361,8 +4385,8 @@
       </dsp:nvSpPr>
       <dsp:spPr>
         <a:xfrm>
-          <a:off x="0" y="2362494"/>
-          <a:ext cx="3088720" cy="256803"/>
+          <a:off x="0" y="2362183"/>
+          <a:ext cx="3088720" cy="257114"/>
         </a:xfrm>
         <a:prstGeom prst="roundRect">
           <a:avLst/>
@@ -4433,8 +4457,8 @@
         </a:p>
       </dsp:txBody>
       <dsp:txXfrm>
-        <a:off x="12536" y="2375030"/>
-        <a:ext cx="3063648" cy="231731"/>
+        <a:off x="12551" y="2374734"/>
+        <a:ext cx="3063618" cy="232012"/>
       </dsp:txXfrm>
     </dsp:sp>
   </dsp:spTree>
@@ -4527,7 +4551,31 @@
                 </a:schemeClr>
               </a:solidFill>
             </a:rPr>
-            <a:t>Cereali contenenti glutine</a:t>
+            <a:t>Cereali contenenti glutine </a:t>
+          </a:r>
+          <a:r>
+            <a:rPr lang="it-IT" sz="1200" kern="1200">
+              <a:solidFill>
+                <a:schemeClr val="dk1">
+                  <a:hueOff val="0"/>
+                  <a:satOff val="0"/>
+                  <a:lumOff val="0"/>
+                </a:schemeClr>
+              </a:solidFill>
+            </a:rPr>
+            <a:t>e prodotti </a:t>
+          </a:r>
+          <a:r>
+            <a:rPr lang="it-IT" sz="1200" kern="1200" dirty="0">
+              <a:solidFill>
+                <a:schemeClr val="dk1">
+                  <a:hueOff val="0"/>
+                  <a:satOff val="0"/>
+                  <a:lumOff val="0"/>
+                </a:schemeClr>
+              </a:solidFill>
+            </a:rPr>
+            <a:t>derivati</a:t>
           </a:r>
         </a:p>
       </dsp:txBody>
@@ -12722,1067 +12770,1055 @@
           </p:txBody>
         </p:sp>
       </p:grpSp>
-      <p:grpSp>
-        <p:nvGrpSpPr>
-          <p:cNvPr id="27" name="Gruppo 26">
+      <p:sp>
+        <p:nvSpPr>
+          <p:cNvPr id="41" name="CasellaDiTesto 40">
             <a:extLst>
               <a:ext uri="{FF2B5EF4-FFF2-40B4-BE49-F238E27FC236}">
-                <a16:creationId xmlns:a16="http://schemas.microsoft.com/office/drawing/2014/main" id="{76AC9D4B-8B09-935C-E1ED-AF10CEF21F3B}"/>
+                <a16:creationId xmlns:a16="http://schemas.microsoft.com/office/drawing/2014/main" id="{F7932D9E-CE45-60D3-50B2-C0482506B166}"/>
               </a:ext>
             </a:extLst>
           </p:cNvPr>
-          <p:cNvGrpSpPr/>
+          <p:cNvSpPr txBox="1"/>
           <p:nvPr/>
-        </p:nvGrpSpPr>
-        <p:grpSpPr>
+        </p:nvSpPr>
+        <p:spPr>
           <a:xfrm>
             <a:off x="542647" y="4737347"/>
-            <a:ext cx="3686987" cy="1680979"/>
-            <a:chOff x="7234879" y="4011084"/>
-            <a:chExt cx="3686987" cy="1680979"/>
+            <a:ext cx="3686987" cy="1861664"/>
           </a:xfrm>
-        </p:grpSpPr>
-        <p:sp>
-          <p:nvSpPr>
-            <p:cNvPr id="41" name="CasellaDiTesto 40">
-              <a:extLst>
-                <a:ext uri="{FF2B5EF4-FFF2-40B4-BE49-F238E27FC236}">
-                  <a16:creationId xmlns:a16="http://schemas.microsoft.com/office/drawing/2014/main" id="{F7932D9E-CE45-60D3-50B2-C0482506B166}"/>
-                </a:ext>
-              </a:extLst>
-            </p:cNvPr>
-            <p:cNvSpPr txBox="1"/>
-            <p:nvPr/>
-          </p:nvSpPr>
-          <p:spPr>
-            <a:xfrm>
-              <a:off x="7234879" y="4011084"/>
-              <a:ext cx="3686987" cy="1680979"/>
-            </a:xfrm>
-            <a:custGeom>
-              <a:avLst/>
-              <a:gdLst>
-                <a:gd name="connsiteX0" fmla="*/ 0 w 3686987"/>
-                <a:gd name="connsiteY0" fmla="*/ 0 h 1680979"/>
-                <a:gd name="connsiteX1" fmla="*/ 452973 w 3686987"/>
-                <a:gd name="connsiteY1" fmla="*/ 0 h 1680979"/>
-                <a:gd name="connsiteX2" fmla="*/ 979685 w 3686987"/>
-                <a:gd name="connsiteY2" fmla="*/ 0 h 1680979"/>
-                <a:gd name="connsiteX3" fmla="*/ 1506398 w 3686987"/>
-                <a:gd name="connsiteY3" fmla="*/ 0 h 1680979"/>
-                <a:gd name="connsiteX4" fmla="*/ 1996240 w 3686987"/>
-                <a:gd name="connsiteY4" fmla="*/ 0 h 1680979"/>
-                <a:gd name="connsiteX5" fmla="*/ 2522953 w 3686987"/>
-                <a:gd name="connsiteY5" fmla="*/ 0 h 1680979"/>
-                <a:gd name="connsiteX6" fmla="*/ 3086535 w 3686987"/>
-                <a:gd name="connsiteY6" fmla="*/ 0 h 1680979"/>
-                <a:gd name="connsiteX7" fmla="*/ 3686987 w 3686987"/>
-                <a:gd name="connsiteY7" fmla="*/ 0 h 1680979"/>
-                <a:gd name="connsiteX8" fmla="*/ 3686987 w 3686987"/>
-                <a:gd name="connsiteY8" fmla="*/ 509897 h 1680979"/>
-                <a:gd name="connsiteX9" fmla="*/ 3686987 w 3686987"/>
-                <a:gd name="connsiteY9" fmla="*/ 1019794 h 1680979"/>
-                <a:gd name="connsiteX10" fmla="*/ 3686987 w 3686987"/>
-                <a:gd name="connsiteY10" fmla="*/ 1680979 h 1680979"/>
-                <a:gd name="connsiteX11" fmla="*/ 3234014 w 3686987"/>
-                <a:gd name="connsiteY11" fmla="*/ 1680979 h 1680979"/>
-                <a:gd name="connsiteX12" fmla="*/ 2670432 w 3686987"/>
-                <a:gd name="connsiteY12" fmla="*/ 1680979 h 1680979"/>
-                <a:gd name="connsiteX13" fmla="*/ 2180589 w 3686987"/>
-                <a:gd name="connsiteY13" fmla="*/ 1680979 h 1680979"/>
-                <a:gd name="connsiteX14" fmla="*/ 1727617 w 3686987"/>
-                <a:gd name="connsiteY14" fmla="*/ 1680979 h 1680979"/>
-                <a:gd name="connsiteX15" fmla="*/ 1274644 w 3686987"/>
-                <a:gd name="connsiteY15" fmla="*/ 1680979 h 1680979"/>
-                <a:gd name="connsiteX16" fmla="*/ 711062 w 3686987"/>
-                <a:gd name="connsiteY16" fmla="*/ 1680979 h 1680979"/>
-                <a:gd name="connsiteX17" fmla="*/ 0 w 3686987"/>
-                <a:gd name="connsiteY17" fmla="*/ 1680979 h 1680979"/>
-                <a:gd name="connsiteX18" fmla="*/ 0 w 3686987"/>
-                <a:gd name="connsiteY18" fmla="*/ 1154272 h 1680979"/>
-                <a:gd name="connsiteX19" fmla="*/ 0 w 3686987"/>
-                <a:gd name="connsiteY19" fmla="*/ 610756 h 1680979"/>
-                <a:gd name="connsiteX20" fmla="*/ 0 w 3686987"/>
-                <a:gd name="connsiteY20" fmla="*/ 0 h 1680979"/>
-              </a:gdLst>
-              <a:ahLst/>
-              <a:cxnLst>
-                <a:cxn ang="0">
-                  <a:pos x="connsiteX0" y="connsiteY0"/>
-                </a:cxn>
-                <a:cxn ang="0">
-                  <a:pos x="connsiteX1" y="connsiteY1"/>
-                </a:cxn>
-                <a:cxn ang="0">
-                  <a:pos x="connsiteX2" y="connsiteY2"/>
-                </a:cxn>
-                <a:cxn ang="0">
-                  <a:pos x="connsiteX3" y="connsiteY3"/>
-                </a:cxn>
-                <a:cxn ang="0">
-                  <a:pos x="connsiteX4" y="connsiteY4"/>
-                </a:cxn>
-                <a:cxn ang="0">
-                  <a:pos x="connsiteX5" y="connsiteY5"/>
-                </a:cxn>
-                <a:cxn ang="0">
-                  <a:pos x="connsiteX6" y="connsiteY6"/>
-                </a:cxn>
-                <a:cxn ang="0">
-                  <a:pos x="connsiteX7" y="connsiteY7"/>
-                </a:cxn>
-                <a:cxn ang="0">
-                  <a:pos x="connsiteX8" y="connsiteY8"/>
-                </a:cxn>
-                <a:cxn ang="0">
-                  <a:pos x="connsiteX9" y="connsiteY9"/>
-                </a:cxn>
-                <a:cxn ang="0">
-                  <a:pos x="connsiteX10" y="connsiteY10"/>
-                </a:cxn>
-                <a:cxn ang="0">
-                  <a:pos x="connsiteX11" y="connsiteY11"/>
-                </a:cxn>
-                <a:cxn ang="0">
-                  <a:pos x="connsiteX12" y="connsiteY12"/>
-                </a:cxn>
-                <a:cxn ang="0">
-                  <a:pos x="connsiteX13" y="connsiteY13"/>
-                </a:cxn>
-                <a:cxn ang="0">
-                  <a:pos x="connsiteX14" y="connsiteY14"/>
-                </a:cxn>
-                <a:cxn ang="0">
-                  <a:pos x="connsiteX15" y="connsiteY15"/>
-                </a:cxn>
-                <a:cxn ang="0">
-                  <a:pos x="connsiteX16" y="connsiteY16"/>
-                </a:cxn>
-                <a:cxn ang="0">
-                  <a:pos x="connsiteX17" y="connsiteY17"/>
-                </a:cxn>
-                <a:cxn ang="0">
-                  <a:pos x="connsiteX18" y="connsiteY18"/>
-                </a:cxn>
-                <a:cxn ang="0">
-                  <a:pos x="connsiteX19" y="connsiteY19"/>
-                </a:cxn>
-                <a:cxn ang="0">
-                  <a:pos x="connsiteX20" y="connsiteY20"/>
-                </a:cxn>
-              </a:cxnLst>
-              <a:rect l="l" t="t" r="r" b="b"/>
-              <a:pathLst>
-                <a:path w="3686987" h="1680979" fill="none" extrusionOk="0">
-                  <a:moveTo>
-                    <a:pt x="0" y="0"/>
-                  </a:moveTo>
-                  <a:cubicBezTo>
-                    <a:pt x="129934" y="-43702"/>
-                    <a:pt x="286924" y="9096"/>
-                    <a:pt x="452973" y="0"/>
-                  </a:cubicBezTo>
-                  <a:cubicBezTo>
-                    <a:pt x="619022" y="-9096"/>
-                    <a:pt x="740879" y="21527"/>
-                    <a:pt x="979685" y="0"/>
-                  </a:cubicBezTo>
-                  <a:cubicBezTo>
-                    <a:pt x="1218491" y="-21527"/>
-                    <a:pt x="1246574" y="41589"/>
-                    <a:pt x="1506398" y="0"/>
-                  </a:cubicBezTo>
-                  <a:cubicBezTo>
-                    <a:pt x="1766222" y="-41589"/>
-                    <a:pt x="1807060" y="19017"/>
-                    <a:pt x="1996240" y="0"/>
-                  </a:cubicBezTo>
-                  <a:cubicBezTo>
-                    <a:pt x="2185420" y="-19017"/>
-                    <a:pt x="2321121" y="28337"/>
-                    <a:pt x="2522953" y="0"/>
-                  </a:cubicBezTo>
-                  <a:cubicBezTo>
-                    <a:pt x="2724785" y="-28337"/>
-                    <a:pt x="2857727" y="1235"/>
-                    <a:pt x="3086535" y="0"/>
-                  </a:cubicBezTo>
-                  <a:cubicBezTo>
-                    <a:pt x="3315343" y="-1235"/>
-                    <a:pt x="3469423" y="61880"/>
-                    <a:pt x="3686987" y="0"/>
-                  </a:cubicBezTo>
-                  <a:cubicBezTo>
-                    <a:pt x="3711721" y="199256"/>
-                    <a:pt x="3684333" y="322672"/>
-                    <a:pt x="3686987" y="509897"/>
-                  </a:cubicBezTo>
-                  <a:cubicBezTo>
-                    <a:pt x="3689641" y="697122"/>
-                    <a:pt x="3643683" y="898025"/>
-                    <a:pt x="3686987" y="1019794"/>
-                  </a:cubicBezTo>
-                  <a:cubicBezTo>
-                    <a:pt x="3730291" y="1141563"/>
-                    <a:pt x="3629160" y="1537464"/>
-                    <a:pt x="3686987" y="1680979"/>
-                  </a:cubicBezTo>
-                  <a:cubicBezTo>
-                    <a:pt x="3471077" y="1726987"/>
-                    <a:pt x="3448594" y="1663667"/>
-                    <a:pt x="3234014" y="1680979"/>
-                  </a:cubicBezTo>
-                  <a:cubicBezTo>
-                    <a:pt x="3019434" y="1698291"/>
-                    <a:pt x="2787630" y="1660002"/>
-                    <a:pt x="2670432" y="1680979"/>
-                  </a:cubicBezTo>
-                  <a:cubicBezTo>
-                    <a:pt x="2553234" y="1701956"/>
-                    <a:pt x="2422499" y="1636815"/>
-                    <a:pt x="2180589" y="1680979"/>
-                  </a:cubicBezTo>
-                  <a:cubicBezTo>
-                    <a:pt x="1938679" y="1725143"/>
-                    <a:pt x="1944906" y="1673968"/>
-                    <a:pt x="1727617" y="1680979"/>
-                  </a:cubicBezTo>
-                  <a:cubicBezTo>
-                    <a:pt x="1510328" y="1687990"/>
-                    <a:pt x="1394936" y="1675514"/>
-                    <a:pt x="1274644" y="1680979"/>
-                  </a:cubicBezTo>
-                  <a:cubicBezTo>
-                    <a:pt x="1154352" y="1686444"/>
-                    <a:pt x="846465" y="1614828"/>
-                    <a:pt x="711062" y="1680979"/>
-                  </a:cubicBezTo>
-                  <a:cubicBezTo>
-                    <a:pt x="575659" y="1747130"/>
-                    <a:pt x="325161" y="1671844"/>
-                    <a:pt x="0" y="1680979"/>
-                  </a:cubicBezTo>
-                  <a:cubicBezTo>
-                    <a:pt x="-5863" y="1553672"/>
-                    <a:pt x="41578" y="1306057"/>
-                    <a:pt x="0" y="1154272"/>
-                  </a:cubicBezTo>
-                  <a:cubicBezTo>
-                    <a:pt x="-41578" y="1002487"/>
-                    <a:pt x="4645" y="856296"/>
-                    <a:pt x="0" y="610756"/>
-                  </a:cubicBezTo>
-                  <a:cubicBezTo>
-                    <a:pt x="-4645" y="365216"/>
-                    <a:pt x="11120" y="139468"/>
-                    <a:pt x="0" y="0"/>
-                  </a:cubicBezTo>
-                  <a:close/>
-                </a:path>
-                <a:path w="3686987" h="1680979" stroke="0" extrusionOk="0">
-                  <a:moveTo>
-                    <a:pt x="0" y="0"/>
-                  </a:moveTo>
-                  <a:cubicBezTo>
-                    <a:pt x="152296" y="-692"/>
-                    <a:pt x="332954" y="5869"/>
-                    <a:pt x="489843" y="0"/>
-                  </a:cubicBezTo>
-                  <a:cubicBezTo>
-                    <a:pt x="646732" y="-5869"/>
-                    <a:pt x="767879" y="20724"/>
-                    <a:pt x="1016555" y="0"/>
-                  </a:cubicBezTo>
-                  <a:cubicBezTo>
-                    <a:pt x="1265231" y="-20724"/>
-                    <a:pt x="1287666" y="28693"/>
-                    <a:pt x="1543267" y="0"/>
-                  </a:cubicBezTo>
-                  <a:cubicBezTo>
-                    <a:pt x="1798868" y="-28693"/>
-                    <a:pt x="1793946" y="1083"/>
-                    <a:pt x="1959370" y="0"/>
-                  </a:cubicBezTo>
-                  <a:cubicBezTo>
-                    <a:pt x="2124794" y="-1083"/>
-                    <a:pt x="2228765" y="57811"/>
-                    <a:pt x="2486083" y="0"/>
-                  </a:cubicBezTo>
-                  <a:cubicBezTo>
-                    <a:pt x="2743401" y="-57811"/>
-                    <a:pt x="2959520" y="69337"/>
-                    <a:pt x="3086535" y="0"/>
-                  </a:cubicBezTo>
-                  <a:cubicBezTo>
-                    <a:pt x="3213550" y="-69337"/>
-                    <a:pt x="3551423" y="71545"/>
-                    <a:pt x="3686987" y="0"/>
-                  </a:cubicBezTo>
-                  <a:cubicBezTo>
-                    <a:pt x="3692557" y="242338"/>
-                    <a:pt x="3636789" y="333440"/>
-                    <a:pt x="3686987" y="560326"/>
-                  </a:cubicBezTo>
-                  <a:cubicBezTo>
-                    <a:pt x="3737185" y="787212"/>
-                    <a:pt x="3659917" y="851579"/>
-                    <a:pt x="3686987" y="1120653"/>
-                  </a:cubicBezTo>
-                  <a:cubicBezTo>
-                    <a:pt x="3714057" y="1389727"/>
-                    <a:pt x="3623209" y="1484793"/>
-                    <a:pt x="3686987" y="1680979"/>
-                  </a:cubicBezTo>
-                  <a:cubicBezTo>
-                    <a:pt x="3549815" y="1689771"/>
-                    <a:pt x="3472153" y="1665605"/>
-                    <a:pt x="3270884" y="1680979"/>
-                  </a:cubicBezTo>
-                  <a:cubicBezTo>
-                    <a:pt x="3069615" y="1696353"/>
-                    <a:pt x="2828117" y="1651675"/>
-                    <a:pt x="2670432" y="1680979"/>
-                  </a:cubicBezTo>
-                  <a:cubicBezTo>
-                    <a:pt x="2512747" y="1710283"/>
-                    <a:pt x="2311793" y="1629538"/>
-                    <a:pt x="2217459" y="1680979"/>
-                  </a:cubicBezTo>
-                  <a:cubicBezTo>
-                    <a:pt x="2123125" y="1732420"/>
-                    <a:pt x="1956863" y="1651692"/>
-                    <a:pt x="1764487" y="1680979"/>
-                  </a:cubicBezTo>
-                  <a:cubicBezTo>
-                    <a:pt x="1572111" y="1710266"/>
-                    <a:pt x="1433755" y="1641169"/>
-                    <a:pt x="1311514" y="1680979"/>
-                  </a:cubicBezTo>
-                  <a:cubicBezTo>
-                    <a:pt x="1189273" y="1720789"/>
-                    <a:pt x="1008380" y="1639623"/>
-                    <a:pt x="784802" y="1680979"/>
-                  </a:cubicBezTo>
-                  <a:cubicBezTo>
-                    <a:pt x="561224" y="1722335"/>
-                    <a:pt x="176838" y="1671639"/>
-                    <a:pt x="0" y="1680979"/>
-                  </a:cubicBezTo>
-                  <a:cubicBezTo>
-                    <a:pt x="-51860" y="1473809"/>
-                    <a:pt x="29836" y="1278550"/>
-                    <a:pt x="0" y="1120653"/>
-                  </a:cubicBezTo>
-                  <a:cubicBezTo>
-                    <a:pt x="-29836" y="962756"/>
-                    <a:pt x="25036" y="784290"/>
-                    <a:pt x="0" y="560326"/>
-                  </a:cubicBezTo>
-                  <a:cubicBezTo>
-                    <a:pt x="-25036" y="336362"/>
-                    <a:pt x="36971" y="164604"/>
-                    <a:pt x="0" y="0"/>
-                  </a:cubicBezTo>
-                  <a:close/>
-                </a:path>
-              </a:pathLst>
-            </a:custGeom>
+          <a:custGeom>
+            <a:avLst/>
+            <a:gdLst>
+              <a:gd name="connsiteX0" fmla="*/ 0 w 3686987"/>
+              <a:gd name="connsiteY0" fmla="*/ 0 h 1861664"/>
+              <a:gd name="connsiteX1" fmla="*/ 452973 w 3686987"/>
+              <a:gd name="connsiteY1" fmla="*/ 0 h 1861664"/>
+              <a:gd name="connsiteX2" fmla="*/ 942815 w 3686987"/>
+              <a:gd name="connsiteY2" fmla="*/ 0 h 1861664"/>
+              <a:gd name="connsiteX3" fmla="*/ 1469528 w 3686987"/>
+              <a:gd name="connsiteY3" fmla="*/ 0 h 1861664"/>
+              <a:gd name="connsiteX4" fmla="*/ 2033110 w 3686987"/>
+              <a:gd name="connsiteY4" fmla="*/ 0 h 1861664"/>
+              <a:gd name="connsiteX5" fmla="*/ 2449213 w 3686987"/>
+              <a:gd name="connsiteY5" fmla="*/ 0 h 1861664"/>
+              <a:gd name="connsiteX6" fmla="*/ 2865316 w 3686987"/>
+              <a:gd name="connsiteY6" fmla="*/ 0 h 1861664"/>
+              <a:gd name="connsiteX7" fmla="*/ 3686987 w 3686987"/>
+              <a:gd name="connsiteY7" fmla="*/ 0 h 1861664"/>
+              <a:gd name="connsiteX8" fmla="*/ 3686987 w 3686987"/>
+              <a:gd name="connsiteY8" fmla="*/ 409566 h 1861664"/>
+              <a:gd name="connsiteX9" fmla="*/ 3686987 w 3686987"/>
+              <a:gd name="connsiteY9" fmla="*/ 837749 h 1861664"/>
+              <a:gd name="connsiteX10" fmla="*/ 3686987 w 3686987"/>
+              <a:gd name="connsiteY10" fmla="*/ 1284548 h 1861664"/>
+              <a:gd name="connsiteX11" fmla="*/ 3686987 w 3686987"/>
+              <a:gd name="connsiteY11" fmla="*/ 1861664 h 1861664"/>
+              <a:gd name="connsiteX12" fmla="*/ 3234014 w 3686987"/>
+              <a:gd name="connsiteY12" fmla="*/ 1861664 h 1861664"/>
+              <a:gd name="connsiteX13" fmla="*/ 2781042 w 3686987"/>
+              <a:gd name="connsiteY13" fmla="*/ 1861664 h 1861664"/>
+              <a:gd name="connsiteX14" fmla="*/ 2217459 w 3686987"/>
+              <a:gd name="connsiteY14" fmla="*/ 1861664 h 1861664"/>
+              <a:gd name="connsiteX15" fmla="*/ 1653877 w 3686987"/>
+              <a:gd name="connsiteY15" fmla="*/ 1861664 h 1861664"/>
+              <a:gd name="connsiteX16" fmla="*/ 1200904 w 3686987"/>
+              <a:gd name="connsiteY16" fmla="*/ 1861664 h 1861664"/>
+              <a:gd name="connsiteX17" fmla="*/ 711062 w 3686987"/>
+              <a:gd name="connsiteY17" fmla="*/ 1861664 h 1861664"/>
+              <a:gd name="connsiteX18" fmla="*/ 0 w 3686987"/>
+              <a:gd name="connsiteY18" fmla="*/ 1861664 h 1861664"/>
+              <a:gd name="connsiteX19" fmla="*/ 0 w 3686987"/>
+              <a:gd name="connsiteY19" fmla="*/ 1359015 h 1861664"/>
+              <a:gd name="connsiteX20" fmla="*/ 0 w 3686987"/>
+              <a:gd name="connsiteY20" fmla="*/ 893599 h 1861664"/>
+              <a:gd name="connsiteX21" fmla="*/ 0 w 3686987"/>
+              <a:gd name="connsiteY21" fmla="*/ 484033 h 1861664"/>
+              <a:gd name="connsiteX22" fmla="*/ 0 w 3686987"/>
+              <a:gd name="connsiteY22" fmla="*/ 0 h 1861664"/>
+            </a:gdLst>
+            <a:ahLst/>
+            <a:cxnLst>
+              <a:cxn ang="0">
+                <a:pos x="connsiteX0" y="connsiteY0"/>
+              </a:cxn>
+              <a:cxn ang="0">
+                <a:pos x="connsiteX1" y="connsiteY1"/>
+              </a:cxn>
+              <a:cxn ang="0">
+                <a:pos x="connsiteX2" y="connsiteY2"/>
+              </a:cxn>
+              <a:cxn ang="0">
+                <a:pos x="connsiteX3" y="connsiteY3"/>
+              </a:cxn>
+              <a:cxn ang="0">
+                <a:pos x="connsiteX4" y="connsiteY4"/>
+              </a:cxn>
+              <a:cxn ang="0">
+                <a:pos x="connsiteX5" y="connsiteY5"/>
+              </a:cxn>
+              <a:cxn ang="0">
+                <a:pos x="connsiteX6" y="connsiteY6"/>
+              </a:cxn>
+              <a:cxn ang="0">
+                <a:pos x="connsiteX7" y="connsiteY7"/>
+              </a:cxn>
+              <a:cxn ang="0">
+                <a:pos x="connsiteX8" y="connsiteY8"/>
+              </a:cxn>
+              <a:cxn ang="0">
+                <a:pos x="connsiteX9" y="connsiteY9"/>
+              </a:cxn>
+              <a:cxn ang="0">
+                <a:pos x="connsiteX10" y="connsiteY10"/>
+              </a:cxn>
+              <a:cxn ang="0">
+                <a:pos x="connsiteX11" y="connsiteY11"/>
+              </a:cxn>
+              <a:cxn ang="0">
+                <a:pos x="connsiteX12" y="connsiteY12"/>
+              </a:cxn>
+              <a:cxn ang="0">
+                <a:pos x="connsiteX13" y="connsiteY13"/>
+              </a:cxn>
+              <a:cxn ang="0">
+                <a:pos x="connsiteX14" y="connsiteY14"/>
+              </a:cxn>
+              <a:cxn ang="0">
+                <a:pos x="connsiteX15" y="connsiteY15"/>
+              </a:cxn>
+              <a:cxn ang="0">
+                <a:pos x="connsiteX16" y="connsiteY16"/>
+              </a:cxn>
+              <a:cxn ang="0">
+                <a:pos x="connsiteX17" y="connsiteY17"/>
+              </a:cxn>
+              <a:cxn ang="0">
+                <a:pos x="connsiteX18" y="connsiteY18"/>
+              </a:cxn>
+              <a:cxn ang="0">
+                <a:pos x="connsiteX19" y="connsiteY19"/>
+              </a:cxn>
+              <a:cxn ang="0">
+                <a:pos x="connsiteX20" y="connsiteY20"/>
+              </a:cxn>
+              <a:cxn ang="0">
+                <a:pos x="connsiteX21" y="connsiteY21"/>
+              </a:cxn>
+              <a:cxn ang="0">
+                <a:pos x="connsiteX22" y="connsiteY22"/>
+              </a:cxn>
+            </a:cxnLst>
+            <a:rect l="l" t="t" r="r" b="b"/>
+            <a:pathLst>
+              <a:path w="3686987" h="1861664" fill="none" extrusionOk="0">
+                <a:moveTo>
+                  <a:pt x="0" y="0"/>
+                </a:moveTo>
+                <a:cubicBezTo>
+                  <a:pt x="124882" y="-33618"/>
+                  <a:pt x="301111" y="44737"/>
+                  <a:pt x="452973" y="0"/>
+                </a:cubicBezTo>
+                <a:cubicBezTo>
+                  <a:pt x="604835" y="-44737"/>
+                  <a:pt x="753635" y="19017"/>
+                  <a:pt x="942815" y="0"/>
+                </a:cubicBezTo>
+                <a:cubicBezTo>
+                  <a:pt x="1131995" y="-19017"/>
+                  <a:pt x="1267696" y="28337"/>
+                  <a:pt x="1469528" y="0"/>
+                </a:cubicBezTo>
+                <a:cubicBezTo>
+                  <a:pt x="1671360" y="-28337"/>
+                  <a:pt x="1804302" y="1235"/>
+                  <a:pt x="2033110" y="0"/>
+                </a:cubicBezTo>
+                <a:cubicBezTo>
+                  <a:pt x="2261918" y="-1235"/>
+                  <a:pt x="2288696" y="42015"/>
+                  <a:pt x="2449213" y="0"/>
+                </a:cubicBezTo>
+                <a:cubicBezTo>
+                  <a:pt x="2609730" y="-42015"/>
+                  <a:pt x="2764105" y="15917"/>
+                  <a:pt x="2865316" y="0"/>
+                </a:cubicBezTo>
+                <a:cubicBezTo>
+                  <a:pt x="2966527" y="-15917"/>
+                  <a:pt x="3373033" y="622"/>
+                  <a:pt x="3686987" y="0"/>
+                </a:cubicBezTo>
+                <a:cubicBezTo>
+                  <a:pt x="3717474" y="121686"/>
+                  <a:pt x="3656586" y="307913"/>
+                  <a:pt x="3686987" y="409566"/>
+                </a:cubicBezTo>
+                <a:cubicBezTo>
+                  <a:pt x="3717388" y="511219"/>
+                  <a:pt x="3652326" y="697421"/>
+                  <a:pt x="3686987" y="837749"/>
+                </a:cubicBezTo>
+                <a:cubicBezTo>
+                  <a:pt x="3721648" y="978077"/>
+                  <a:pt x="3636732" y="1182396"/>
+                  <a:pt x="3686987" y="1284548"/>
+                </a:cubicBezTo>
+                <a:cubicBezTo>
+                  <a:pt x="3737242" y="1386700"/>
+                  <a:pt x="3681295" y="1710091"/>
+                  <a:pt x="3686987" y="1861664"/>
+                </a:cubicBezTo>
+                <a:cubicBezTo>
+                  <a:pt x="3474786" y="1876587"/>
+                  <a:pt x="3456356" y="1859253"/>
+                  <a:pt x="3234014" y="1861664"/>
+                </a:cubicBezTo>
+                <a:cubicBezTo>
+                  <a:pt x="3011672" y="1864075"/>
+                  <a:pt x="2899754" y="1852177"/>
+                  <a:pt x="2781042" y="1861664"/>
+                </a:cubicBezTo>
+                <a:cubicBezTo>
+                  <a:pt x="2662330" y="1871151"/>
+                  <a:pt x="2359930" y="1798148"/>
+                  <a:pt x="2217459" y="1861664"/>
+                </a:cubicBezTo>
+                <a:cubicBezTo>
+                  <a:pt x="2074988" y="1925180"/>
+                  <a:pt x="1814277" y="1856769"/>
+                  <a:pt x="1653877" y="1861664"/>
+                </a:cubicBezTo>
+                <a:cubicBezTo>
+                  <a:pt x="1493477" y="1866559"/>
+                  <a:pt x="1390264" y="1861048"/>
+                  <a:pt x="1200904" y="1861664"/>
+                </a:cubicBezTo>
+                <a:cubicBezTo>
+                  <a:pt x="1011544" y="1862280"/>
+                  <a:pt x="896329" y="1839178"/>
+                  <a:pt x="711062" y="1861664"/>
+                </a:cubicBezTo>
+                <a:cubicBezTo>
+                  <a:pt x="525795" y="1884150"/>
+                  <a:pt x="260213" y="1780405"/>
+                  <a:pt x="0" y="1861664"/>
+                </a:cubicBezTo>
+                <a:cubicBezTo>
+                  <a:pt x="-17140" y="1705143"/>
+                  <a:pt x="54146" y="1602233"/>
+                  <a:pt x="0" y="1359015"/>
+                </a:cubicBezTo>
+                <a:cubicBezTo>
+                  <a:pt x="-54146" y="1115797"/>
+                  <a:pt x="48865" y="999127"/>
+                  <a:pt x="0" y="893599"/>
+                </a:cubicBezTo>
+                <a:cubicBezTo>
+                  <a:pt x="-48865" y="788071"/>
+                  <a:pt x="36330" y="605323"/>
+                  <a:pt x="0" y="484033"/>
+                </a:cubicBezTo>
+                <a:cubicBezTo>
+                  <a:pt x="-36330" y="362743"/>
+                  <a:pt x="35957" y="162900"/>
+                  <a:pt x="0" y="0"/>
+                </a:cubicBezTo>
+                <a:close/>
+              </a:path>
+              <a:path w="3686987" h="1861664" stroke="0" extrusionOk="0">
+                <a:moveTo>
+                  <a:pt x="0" y="0"/>
+                </a:moveTo>
+                <a:cubicBezTo>
+                  <a:pt x="152296" y="-692"/>
+                  <a:pt x="332954" y="5869"/>
+                  <a:pt x="489843" y="0"/>
+                </a:cubicBezTo>
+                <a:cubicBezTo>
+                  <a:pt x="646732" y="-5869"/>
+                  <a:pt x="767879" y="20724"/>
+                  <a:pt x="1016555" y="0"/>
+                </a:cubicBezTo>
+                <a:cubicBezTo>
+                  <a:pt x="1265231" y="-20724"/>
+                  <a:pt x="1287666" y="28693"/>
+                  <a:pt x="1543267" y="0"/>
+                </a:cubicBezTo>
+                <a:cubicBezTo>
+                  <a:pt x="1798868" y="-28693"/>
+                  <a:pt x="1793946" y="1083"/>
+                  <a:pt x="1959370" y="0"/>
+                </a:cubicBezTo>
+                <a:cubicBezTo>
+                  <a:pt x="2124794" y="-1083"/>
+                  <a:pt x="2228765" y="57811"/>
+                  <a:pt x="2486083" y="0"/>
+                </a:cubicBezTo>
+                <a:cubicBezTo>
+                  <a:pt x="2743401" y="-57811"/>
+                  <a:pt x="2959520" y="69337"/>
+                  <a:pt x="3086535" y="0"/>
+                </a:cubicBezTo>
+                <a:cubicBezTo>
+                  <a:pt x="3213550" y="-69337"/>
+                  <a:pt x="3551423" y="71545"/>
+                  <a:pt x="3686987" y="0"/>
+                </a:cubicBezTo>
+                <a:cubicBezTo>
+                  <a:pt x="3724680" y="199738"/>
+                  <a:pt x="3683091" y="315379"/>
+                  <a:pt x="3686987" y="465416"/>
+                </a:cubicBezTo>
+                <a:cubicBezTo>
+                  <a:pt x="3690883" y="615453"/>
+                  <a:pt x="3637222" y="813433"/>
+                  <a:pt x="3686987" y="930832"/>
+                </a:cubicBezTo>
+                <a:cubicBezTo>
+                  <a:pt x="3736752" y="1048231"/>
+                  <a:pt x="3637575" y="1242298"/>
+                  <a:pt x="3686987" y="1396248"/>
+                </a:cubicBezTo>
+                <a:cubicBezTo>
+                  <a:pt x="3736399" y="1550198"/>
+                  <a:pt x="3680098" y="1688107"/>
+                  <a:pt x="3686987" y="1861664"/>
+                </a:cubicBezTo>
+                <a:cubicBezTo>
+                  <a:pt x="3586317" y="1876876"/>
+                  <a:pt x="3420479" y="1850487"/>
+                  <a:pt x="3270884" y="1861664"/>
+                </a:cubicBezTo>
+                <a:cubicBezTo>
+                  <a:pt x="3121289" y="1872841"/>
+                  <a:pt x="2912245" y="1810223"/>
+                  <a:pt x="2817911" y="1861664"/>
+                </a:cubicBezTo>
+                <a:cubicBezTo>
+                  <a:pt x="2723577" y="1913105"/>
+                  <a:pt x="2557315" y="1832377"/>
+                  <a:pt x="2364939" y="1861664"/>
+                </a:cubicBezTo>
+                <a:cubicBezTo>
+                  <a:pt x="2172563" y="1890951"/>
+                  <a:pt x="2034207" y="1821854"/>
+                  <a:pt x="1911966" y="1861664"/>
+                </a:cubicBezTo>
+                <a:cubicBezTo>
+                  <a:pt x="1789725" y="1901474"/>
+                  <a:pt x="1608832" y="1820308"/>
+                  <a:pt x="1385254" y="1861664"/>
+                </a:cubicBezTo>
+                <a:cubicBezTo>
+                  <a:pt x="1161676" y="1903020"/>
+                  <a:pt x="1010616" y="1804196"/>
+                  <a:pt x="858541" y="1861664"/>
+                </a:cubicBezTo>
+                <a:cubicBezTo>
+                  <a:pt x="706466" y="1919132"/>
+                  <a:pt x="351619" y="1799034"/>
+                  <a:pt x="0" y="1861664"/>
+                </a:cubicBezTo>
+                <a:cubicBezTo>
+                  <a:pt x="-11432" y="1620778"/>
+                  <a:pt x="52838" y="1553047"/>
+                  <a:pt x="0" y="1377631"/>
+                </a:cubicBezTo>
+                <a:cubicBezTo>
+                  <a:pt x="-52838" y="1202215"/>
+                  <a:pt x="36353" y="1085450"/>
+                  <a:pt x="0" y="949449"/>
+                </a:cubicBezTo>
+                <a:cubicBezTo>
+                  <a:pt x="-36353" y="813448"/>
+                  <a:pt x="4914" y="616546"/>
+                  <a:pt x="0" y="521266"/>
+                </a:cubicBezTo>
+                <a:cubicBezTo>
+                  <a:pt x="-4914" y="425986"/>
+                  <a:pt x="23622" y="256143"/>
+                  <a:pt x="0" y="0"/>
+                </a:cubicBezTo>
+                <a:close/>
+              </a:path>
+            </a:pathLst>
+          </a:custGeom>
+          <a:solidFill>
+            <a:schemeClr val="accent2"/>
+          </a:solidFill>
+          <a:ln>
             <a:solidFill>
-              <a:schemeClr val="accent2"/>
+              <a:schemeClr val="tx1"/>
             </a:solidFill>
-            <a:ln>
-              <a:solidFill>
-                <a:schemeClr val="tx1"/>
-              </a:solidFill>
-              <a:extLst>
-                <a:ext uri="{C807C97D-BFC1-408E-A445-0C87EB9F89A2}">
-                  <ask:lineSketchStyleProps xmlns:ask="http://schemas.microsoft.com/office/drawing/2018/sketchyshapes" sd="1481330856">
-                    <a:prstGeom prst="rect">
-                      <a:avLst/>
-                    </a:prstGeom>
-                    <ask:type>
-                      <ask:lineSketchScribble/>
-                    </ask:type>
-                  </ask:lineSketchStyleProps>
-                </a:ext>
-              </a:extLst>
-            </a:ln>
-          </p:spPr>
-          <p:txBody>
-            <a:bodyPr wrap="square" rtlCol="0">
-              <a:normAutofit/>
-            </a:bodyPr>
-            <a:lstStyle/>
-            <a:p>
-              <a:r>
-                <a:rPr lang="it-IT" sz="1400" b="1" dirty="0">
-                  <a:solidFill>
-                    <a:schemeClr val="bg1"/>
-                  </a:solidFill>
-                </a:rPr>
-                <a:t>Categoria</a:t>
-              </a:r>
-            </a:p>
-          </p:txBody>
-        </p:sp>
-        <p:grpSp>
-          <p:nvGrpSpPr>
-            <p:cNvPr id="43" name="Gruppo 42">
-              <a:extLst>
-                <a:ext uri="{FF2B5EF4-FFF2-40B4-BE49-F238E27FC236}">
-                  <a16:creationId xmlns:a16="http://schemas.microsoft.com/office/drawing/2014/main" id="{B31C5B9C-1E98-5EB5-876D-D735B78B20F4}"/>
-                </a:ext>
-              </a:extLst>
-            </p:cNvPr>
-            <p:cNvGrpSpPr/>
-            <p:nvPr/>
-          </p:nvGrpSpPr>
-          <p:grpSpPr>
-            <a:xfrm>
-              <a:off x="7382821" y="4267637"/>
-              <a:ext cx="1356965" cy="1424426"/>
-              <a:chOff x="6616831" y="2437850"/>
-              <a:chExt cx="1197689" cy="1424426"/>
-            </a:xfrm>
-          </p:grpSpPr>
-          <p:sp>
-            <p:nvSpPr>
-              <p:cNvPr id="38" name="CasellaDiTesto 37">
-                <a:extLst>
-                  <a:ext uri="{FF2B5EF4-FFF2-40B4-BE49-F238E27FC236}">
-                    <a16:creationId xmlns:a16="http://schemas.microsoft.com/office/drawing/2014/main" id="{6E2C127A-FE1E-42CE-9742-843A1765E519}"/>
-                  </a:ext>
-                </a:extLst>
-              </p:cNvPr>
-              <p:cNvSpPr txBox="1">
-                <a:spLocks/>
-              </p:cNvSpPr>
-              <p:nvPr/>
-            </p:nvSpPr>
-            <p:spPr>
-              <a:xfrm>
-                <a:off x="6616831" y="2437850"/>
-                <a:ext cx="648453" cy="276999"/>
-              </a:xfrm>
-              <a:prstGeom prst="rect">
-                <a:avLst/>
-              </a:prstGeom>
-              <a:noFill/>
-            </p:spPr>
-            <p:txBody>
-              <a:bodyPr wrap="none" rtlCol="0">
-                <a:spAutoFit/>
-              </a:bodyPr>
-              <a:lstStyle/>
-              <a:p>
-                <a:r>
-                  <a:rPr lang="it-IT" sz="1200" b="1" dirty="0"/>
-                  <a:t>Bevanda</a:t>
-                </a:r>
-                <a:endParaRPr lang="it-IT" sz="1600" b="1" dirty="0"/>
-              </a:p>
-            </p:txBody>
-          </p:sp>
-          <p:sp>
-            <p:nvSpPr>
-              <p:cNvPr id="16" name="Rettangolo con angoli arrotondati 15">
-                <a:extLst>
-                  <a:ext uri="{FF2B5EF4-FFF2-40B4-BE49-F238E27FC236}">
-                    <a16:creationId xmlns:a16="http://schemas.microsoft.com/office/drawing/2014/main" id="{F6D9A4E7-7F59-94CF-328C-BB97091BA84B}"/>
-                  </a:ext>
-                </a:extLst>
-              </p:cNvPr>
-              <p:cNvSpPr>
-                <a:spLocks/>
-              </p:cNvSpPr>
-              <p:nvPr/>
-            </p:nvSpPr>
-            <p:spPr>
-              <a:xfrm>
-                <a:off x="6804329" y="2945184"/>
-                <a:ext cx="107812" cy="102806"/>
-              </a:xfrm>
-              <a:prstGeom prst="roundRect">
-                <a:avLst/>
-              </a:prstGeom>
-              <a:ln/>
-            </p:spPr>
-            <p:style>
-              <a:lnRef idx="2">
-                <a:schemeClr val="accent3"/>
-              </a:lnRef>
-              <a:fillRef idx="1">
-                <a:schemeClr val="lt1"/>
-              </a:fillRef>
-              <a:effectRef idx="0">
-                <a:schemeClr val="accent3"/>
-              </a:effectRef>
-              <a:fontRef idx="minor">
-                <a:schemeClr val="dk1"/>
-              </a:fontRef>
-            </p:style>
-            <p:txBody>
-              <a:bodyPr rtlCol="0" anchor="ctr"/>
-              <a:lstStyle/>
-              <a:p>
-                <a:pPr algn="ctr"/>
-                <a:endParaRPr lang="it-IT" dirty="0"/>
-              </a:p>
-            </p:txBody>
-          </p:sp>
-          <p:sp>
-            <p:nvSpPr>
-              <p:cNvPr id="17" name="CasellaDiTesto 16">
-                <a:extLst>
-                  <a:ext uri="{FF2B5EF4-FFF2-40B4-BE49-F238E27FC236}">
-                    <a16:creationId xmlns:a16="http://schemas.microsoft.com/office/drawing/2014/main" id="{737F7374-6BBC-B874-759F-5048EAACC7BF}"/>
-                  </a:ext>
-                </a:extLst>
-              </p:cNvPr>
-              <p:cNvSpPr txBox="1">
-                <a:spLocks/>
-              </p:cNvSpPr>
-              <p:nvPr/>
-            </p:nvSpPr>
-            <p:spPr>
-              <a:xfrm>
-                <a:off x="6993569" y="2871223"/>
-                <a:ext cx="692314" cy="276999"/>
-              </a:xfrm>
-              <a:prstGeom prst="rect">
-                <a:avLst/>
-              </a:prstGeom>
-              <a:noFill/>
-            </p:spPr>
-            <p:txBody>
-              <a:bodyPr wrap="none" rtlCol="0">
-                <a:spAutoFit/>
-              </a:bodyPr>
-              <a:lstStyle/>
-              <a:p>
-                <a:r>
-                  <a:rPr lang="it-IT" sz="1200" dirty="0"/>
-                  <a:t>Antipasto</a:t>
-                </a:r>
-                <a:endParaRPr lang="it-IT" sz="1600" dirty="0"/>
-              </a:p>
-            </p:txBody>
-          </p:sp>
-          <p:sp>
-            <p:nvSpPr>
-              <p:cNvPr id="31" name="CasellaDiTesto 30">
-                <a:extLst>
-                  <a:ext uri="{FF2B5EF4-FFF2-40B4-BE49-F238E27FC236}">
-                    <a16:creationId xmlns:a16="http://schemas.microsoft.com/office/drawing/2014/main" id="{DE27DA4D-FEBF-13CA-4EE1-70A3437EBD61}"/>
-                  </a:ext>
-                </a:extLst>
-              </p:cNvPr>
-              <p:cNvSpPr txBox="1">
-                <a:spLocks/>
-              </p:cNvSpPr>
-              <p:nvPr/>
-            </p:nvSpPr>
-            <p:spPr>
-              <a:xfrm>
-                <a:off x="6616831" y="2692227"/>
-                <a:ext cx="416249" cy="276999"/>
-              </a:xfrm>
-              <a:prstGeom prst="rect">
-                <a:avLst/>
-              </a:prstGeom>
-              <a:noFill/>
-            </p:spPr>
-            <p:txBody>
-              <a:bodyPr wrap="none" rtlCol="0">
-                <a:spAutoFit/>
-              </a:bodyPr>
-              <a:lstStyle/>
-              <a:p>
-                <a:r>
-                  <a:rPr lang="it-IT" sz="1200" b="1" dirty="0">
-                    <a:solidFill>
-                      <a:schemeClr val="accent2">
-                        <a:lumMod val="50000"/>
-                      </a:schemeClr>
-                    </a:solidFill>
-                  </a:rPr>
-                  <a:t>Cibo</a:t>
-                </a:r>
-                <a:endParaRPr lang="it-IT" sz="1600" b="1" dirty="0">
-                  <a:solidFill>
-                    <a:schemeClr val="accent2">
-                      <a:lumMod val="50000"/>
-                    </a:schemeClr>
-                  </a:solidFill>
-                </a:endParaRPr>
-              </a:p>
-            </p:txBody>
-          </p:sp>
-          <p:sp>
-            <p:nvSpPr>
-              <p:cNvPr id="47" name="Rettangolo con angoli arrotondati 46">
-                <a:extLst>
-                  <a:ext uri="{FF2B5EF4-FFF2-40B4-BE49-F238E27FC236}">
-                    <a16:creationId xmlns:a16="http://schemas.microsoft.com/office/drawing/2014/main" id="{63F1A774-89E6-6AC2-8500-84E896AC25BA}"/>
-                  </a:ext>
-                </a:extLst>
-              </p:cNvPr>
-              <p:cNvSpPr>
-                <a:spLocks/>
-              </p:cNvSpPr>
-              <p:nvPr/>
-            </p:nvSpPr>
-            <p:spPr>
-              <a:xfrm>
-                <a:off x="6804329" y="3122873"/>
-                <a:ext cx="107812" cy="102806"/>
-              </a:xfrm>
-              <a:prstGeom prst="roundRect">
-                <a:avLst/>
-              </a:prstGeom>
-              <a:ln/>
-            </p:spPr>
-            <p:style>
-              <a:lnRef idx="2">
-                <a:schemeClr val="accent3"/>
-              </a:lnRef>
-              <a:fillRef idx="1">
-                <a:schemeClr val="lt1"/>
-              </a:fillRef>
-              <a:effectRef idx="0">
-                <a:schemeClr val="accent3"/>
-              </a:effectRef>
-              <a:fontRef idx="minor">
-                <a:schemeClr val="dk1"/>
-              </a:fontRef>
-            </p:style>
-            <p:txBody>
-              <a:bodyPr rtlCol="0" anchor="ctr"/>
-              <a:lstStyle/>
-              <a:p>
-                <a:pPr algn="ctr"/>
-                <a:endParaRPr lang="it-IT" dirty="0"/>
-              </a:p>
-            </p:txBody>
-          </p:sp>
-          <p:sp>
-            <p:nvSpPr>
-              <p:cNvPr id="48" name="CasellaDiTesto 47">
-                <a:extLst>
-                  <a:ext uri="{FF2B5EF4-FFF2-40B4-BE49-F238E27FC236}">
-                    <a16:creationId xmlns:a16="http://schemas.microsoft.com/office/drawing/2014/main" id="{BD5637AA-C45F-7F47-7C41-4ADEA74E3F16}"/>
-                  </a:ext>
-                </a:extLst>
-              </p:cNvPr>
-              <p:cNvSpPr txBox="1">
-                <a:spLocks/>
-              </p:cNvSpPr>
-              <p:nvPr/>
-            </p:nvSpPr>
-            <p:spPr>
-              <a:xfrm>
-                <a:off x="6993569" y="3048912"/>
-                <a:ext cx="492650" cy="276999"/>
-              </a:xfrm>
-              <a:prstGeom prst="rect">
-                <a:avLst/>
-              </a:prstGeom>
-              <a:noFill/>
-            </p:spPr>
-            <p:txBody>
-              <a:bodyPr wrap="none" rtlCol="0">
-                <a:spAutoFit/>
-              </a:bodyPr>
-              <a:lstStyle/>
-              <a:p>
-                <a:r>
-                  <a:rPr lang="it-IT" sz="1200" dirty="0"/>
-                  <a:t>Primo</a:t>
-                </a:r>
-                <a:endParaRPr lang="it-IT" sz="1600" dirty="0"/>
-              </a:p>
-            </p:txBody>
-          </p:sp>
-          <p:sp>
-            <p:nvSpPr>
-              <p:cNvPr id="55" name="Rettangolo con angoli arrotondati 54">
-                <a:extLst>
-                  <a:ext uri="{FF2B5EF4-FFF2-40B4-BE49-F238E27FC236}">
-                    <a16:creationId xmlns:a16="http://schemas.microsoft.com/office/drawing/2014/main" id="{FB4118B8-F957-8815-023B-EADE1CF572A3}"/>
-                  </a:ext>
-                </a:extLst>
-              </p:cNvPr>
-              <p:cNvSpPr>
-                <a:spLocks/>
-              </p:cNvSpPr>
-              <p:nvPr/>
-            </p:nvSpPr>
-            <p:spPr>
-              <a:xfrm>
-                <a:off x="6804329" y="3303959"/>
-                <a:ext cx="107812" cy="102806"/>
-              </a:xfrm>
-              <a:prstGeom prst="roundRect">
-                <a:avLst/>
-              </a:prstGeom>
-              <a:ln/>
-            </p:spPr>
-            <p:style>
-              <a:lnRef idx="2">
-                <a:schemeClr val="accent3"/>
-              </a:lnRef>
-              <a:fillRef idx="1">
-                <a:schemeClr val="lt1"/>
-              </a:fillRef>
-              <a:effectRef idx="0">
-                <a:schemeClr val="accent3"/>
-              </a:effectRef>
-              <a:fontRef idx="minor">
-                <a:schemeClr val="dk1"/>
-              </a:fontRef>
-            </p:style>
-            <p:txBody>
-              <a:bodyPr rtlCol="0" anchor="ctr"/>
-              <a:lstStyle/>
-              <a:p>
-                <a:pPr algn="ctr"/>
-                <a:endParaRPr lang="it-IT" dirty="0"/>
-              </a:p>
-            </p:txBody>
-          </p:sp>
-          <p:sp>
-            <p:nvSpPr>
-              <p:cNvPr id="56" name="CasellaDiTesto 55">
-                <a:extLst>
-                  <a:ext uri="{FF2B5EF4-FFF2-40B4-BE49-F238E27FC236}">
-                    <a16:creationId xmlns:a16="http://schemas.microsoft.com/office/drawing/2014/main" id="{525E88C2-DF2D-0403-72EE-0F89DB02D079}"/>
-                  </a:ext>
-                </a:extLst>
-              </p:cNvPr>
-              <p:cNvSpPr txBox="1">
-                <a:spLocks/>
-              </p:cNvSpPr>
-              <p:nvPr/>
-            </p:nvSpPr>
-            <p:spPr>
-              <a:xfrm>
-                <a:off x="6993569" y="3229998"/>
-                <a:ext cx="635833" cy="276999"/>
-              </a:xfrm>
-              <a:prstGeom prst="rect">
-                <a:avLst/>
-              </a:prstGeom>
-              <a:noFill/>
-            </p:spPr>
-            <p:txBody>
-              <a:bodyPr wrap="none" rtlCol="0">
-                <a:spAutoFit/>
-              </a:bodyPr>
-              <a:lstStyle/>
-              <a:p>
-                <a:r>
-                  <a:rPr lang="it-IT" sz="1200" dirty="0"/>
-                  <a:t>Secondo</a:t>
-                </a:r>
-                <a:endParaRPr lang="it-IT" sz="1600" dirty="0"/>
-              </a:p>
-            </p:txBody>
-          </p:sp>
-          <p:sp>
-            <p:nvSpPr>
-              <p:cNvPr id="57" name="Rettangolo con angoli arrotondati 56">
-                <a:extLst>
-                  <a:ext uri="{FF2B5EF4-FFF2-40B4-BE49-F238E27FC236}">
-                    <a16:creationId xmlns:a16="http://schemas.microsoft.com/office/drawing/2014/main" id="{1FB11982-063F-DF8B-06F0-D99E2A52611A}"/>
-                  </a:ext>
-                </a:extLst>
-              </p:cNvPr>
-              <p:cNvSpPr>
-                <a:spLocks/>
-              </p:cNvSpPr>
-              <p:nvPr/>
-            </p:nvSpPr>
-            <p:spPr>
-              <a:xfrm>
-                <a:off x="6804329" y="3481648"/>
-                <a:ext cx="107812" cy="102806"/>
-              </a:xfrm>
-              <a:prstGeom prst="roundRect">
-                <a:avLst/>
-              </a:prstGeom>
-              <a:ln/>
-            </p:spPr>
-            <p:style>
-              <a:lnRef idx="2">
-                <a:schemeClr val="accent3"/>
-              </a:lnRef>
-              <a:fillRef idx="1">
-                <a:schemeClr val="lt1"/>
-              </a:fillRef>
-              <a:effectRef idx="0">
-                <a:schemeClr val="accent3"/>
-              </a:effectRef>
-              <a:fontRef idx="minor">
-                <a:schemeClr val="dk1"/>
-              </a:fontRef>
-            </p:style>
-            <p:txBody>
-              <a:bodyPr rtlCol="0" anchor="ctr"/>
-              <a:lstStyle/>
-              <a:p>
-                <a:pPr algn="ctr"/>
-                <a:endParaRPr lang="it-IT" dirty="0"/>
-              </a:p>
-            </p:txBody>
-          </p:sp>
-          <p:sp>
-            <p:nvSpPr>
-              <p:cNvPr id="58" name="CasellaDiTesto 57">
-                <a:extLst>
-                  <a:ext uri="{FF2B5EF4-FFF2-40B4-BE49-F238E27FC236}">
-                    <a16:creationId xmlns:a16="http://schemas.microsoft.com/office/drawing/2014/main" id="{A84791F5-2CAD-AADD-1FC6-1C225104B930}"/>
-                  </a:ext>
-                </a:extLst>
-              </p:cNvPr>
-              <p:cNvSpPr txBox="1">
-                <a:spLocks/>
-              </p:cNvSpPr>
-              <p:nvPr/>
-            </p:nvSpPr>
-            <p:spPr>
-              <a:xfrm>
-                <a:off x="6993569" y="3407687"/>
-                <a:ext cx="682523" cy="276999"/>
-              </a:xfrm>
-              <a:prstGeom prst="rect">
-                <a:avLst/>
-              </a:prstGeom>
-              <a:noFill/>
-            </p:spPr>
-            <p:txBody>
-              <a:bodyPr wrap="none" rtlCol="0">
-                <a:spAutoFit/>
-              </a:bodyPr>
-              <a:lstStyle/>
-              <a:p>
-                <a:r>
-                  <a:rPr lang="it-IT" sz="1200" dirty="0"/>
-                  <a:t>Contorno</a:t>
-                </a:r>
-                <a:endParaRPr lang="it-IT" sz="1600" dirty="0"/>
-              </a:p>
-            </p:txBody>
-          </p:sp>
-          <p:sp>
-            <p:nvSpPr>
-              <p:cNvPr id="59" name="Rettangolo con angoli arrotondati 58">
-                <a:extLst>
-                  <a:ext uri="{FF2B5EF4-FFF2-40B4-BE49-F238E27FC236}">
-                    <a16:creationId xmlns:a16="http://schemas.microsoft.com/office/drawing/2014/main" id="{BB7F68B4-80FD-73A0-81CA-8E9AF886230C}"/>
-                  </a:ext>
-                </a:extLst>
-              </p:cNvPr>
-              <p:cNvSpPr>
-                <a:spLocks/>
-              </p:cNvSpPr>
-              <p:nvPr/>
-            </p:nvSpPr>
-            <p:spPr>
-              <a:xfrm>
-                <a:off x="6804329" y="3659238"/>
-                <a:ext cx="107812" cy="102806"/>
-              </a:xfrm>
-              <a:prstGeom prst="roundRect">
-                <a:avLst/>
-              </a:prstGeom>
-              <a:ln/>
-            </p:spPr>
-            <p:style>
-              <a:lnRef idx="2">
-                <a:schemeClr val="accent3"/>
-              </a:lnRef>
-              <a:fillRef idx="1">
-                <a:schemeClr val="lt1"/>
-              </a:fillRef>
-              <a:effectRef idx="0">
-                <a:schemeClr val="accent3"/>
-              </a:effectRef>
-              <a:fontRef idx="minor">
-                <a:schemeClr val="dk1"/>
-              </a:fontRef>
-            </p:style>
-            <p:txBody>
-              <a:bodyPr rtlCol="0" anchor="ctr"/>
-              <a:lstStyle/>
-              <a:p>
-                <a:pPr algn="ctr"/>
-                <a:endParaRPr lang="it-IT" dirty="0"/>
-              </a:p>
-            </p:txBody>
-          </p:sp>
-          <p:sp>
-            <p:nvSpPr>
-              <p:cNvPr id="60" name="CasellaDiTesto 59">
-                <a:extLst>
-                  <a:ext uri="{FF2B5EF4-FFF2-40B4-BE49-F238E27FC236}">
-                    <a16:creationId xmlns:a16="http://schemas.microsoft.com/office/drawing/2014/main" id="{4BB67F74-9F5D-3726-1031-28A99C04F67A}"/>
-                  </a:ext>
-                </a:extLst>
-              </p:cNvPr>
-              <p:cNvSpPr txBox="1">
-                <a:spLocks/>
-              </p:cNvSpPr>
-              <p:nvPr/>
-            </p:nvSpPr>
-            <p:spPr>
-              <a:xfrm>
-                <a:off x="6993569" y="3585277"/>
-                <a:ext cx="820951" cy="276999"/>
-              </a:xfrm>
-              <a:prstGeom prst="rect">
-                <a:avLst/>
-              </a:prstGeom>
-              <a:noFill/>
-            </p:spPr>
-            <p:txBody>
-              <a:bodyPr wrap="none" rtlCol="0">
-                <a:spAutoFit/>
-              </a:bodyPr>
-              <a:lstStyle/>
-              <a:p>
-                <a:r>
-                  <a:rPr lang="it-IT" sz="1200" dirty="0"/>
-                  <a:t>Piatto unico</a:t>
-                </a:r>
-                <a:endParaRPr lang="it-IT" sz="1600" dirty="0"/>
-              </a:p>
-            </p:txBody>
-          </p:sp>
-        </p:grpSp>
-        <p:pic>
-          <p:nvPicPr>
-            <p:cNvPr id="9" name="Elemento grafico 8" descr="Accento circonflesso verso il basso con riempimento a tinta unita">
-              <a:extLst>
-                <a:ext uri="{FF2B5EF4-FFF2-40B4-BE49-F238E27FC236}">
-                  <a16:creationId xmlns:a16="http://schemas.microsoft.com/office/drawing/2014/main" id="{BC6433CF-1906-4E8D-3FB7-9145456FE6A1}"/>
-                </a:ext>
-              </a:extLst>
-            </p:cNvPr>
-            <p:cNvPicPr>
-              <a:picLocks noChangeAspect="1"/>
-            </p:cNvPicPr>
-            <p:nvPr/>
-          </p:nvPicPr>
-          <p:blipFill>
-            <a:blip r:embed="rId6">
-              <a:extLst>
-                <a:ext uri="{28A0092B-C50C-407E-A947-70E740481C1C}">
-                  <a14:useLocalDpi xmlns:a14="http://schemas.microsoft.com/office/drawing/2010/main" val="0"/>
-                </a:ext>
-                <a:ext uri="{96DAC541-7B7A-43D3-8B79-37D633B846F1}">
-                  <asvg:svgBlip xmlns:asvg="http://schemas.microsoft.com/office/drawing/2016/SVG/main" r:embed="rId7"/>
-                </a:ext>
-              </a:extLst>
-            </a:blip>
-            <a:stretch>
-              <a:fillRect/>
-            </a:stretch>
-          </p:blipFill>
-          <p:spPr>
-            <a:xfrm>
-              <a:off x="8642249" y="4300001"/>
-              <a:ext cx="252336" cy="252336"/>
-            </a:xfrm>
-            <a:prstGeom prst="rect">
-              <a:avLst/>
-            </a:prstGeom>
-          </p:spPr>
-        </p:pic>
-        <p:pic>
-          <p:nvPicPr>
-            <p:cNvPr id="32" name="Elemento grafico 31" descr="Accento circonflesso verso il basso con riempimento a tinta unita">
-              <a:extLst>
-                <a:ext uri="{FF2B5EF4-FFF2-40B4-BE49-F238E27FC236}">
-                  <a16:creationId xmlns:a16="http://schemas.microsoft.com/office/drawing/2014/main" id="{ED2641BD-7603-5AB4-B959-9C1C1DEBA609}"/>
-                </a:ext>
-              </a:extLst>
-            </p:cNvPr>
-            <p:cNvPicPr>
-              <a:picLocks noChangeAspect="1"/>
-            </p:cNvPicPr>
-            <p:nvPr/>
-          </p:nvPicPr>
-          <p:blipFill>
-            <a:blip r:embed="rId8">
-              <a:extLst>
-                <a:ext uri="{28A0092B-C50C-407E-A947-70E740481C1C}">
-                  <a14:useLocalDpi xmlns:a14="http://schemas.microsoft.com/office/drawing/2010/main" val="0"/>
-                </a:ext>
-                <a:ext uri="{96DAC541-7B7A-43D3-8B79-37D633B846F1}">
-                  <asvg:svgBlip xmlns:asvg="http://schemas.microsoft.com/office/drawing/2016/SVG/main" r:embed="rId9"/>
-                </a:ext>
-              </a:extLst>
-            </a:blip>
-            <a:stretch>
-              <a:fillRect/>
-            </a:stretch>
-          </p:blipFill>
-          <p:spPr>
-            <a:xfrm rot="10800000">
-              <a:off x="8642249" y="4554378"/>
-              <a:ext cx="252336" cy="252336"/>
-            </a:xfrm>
-            <a:prstGeom prst="rect">
-              <a:avLst/>
-            </a:prstGeom>
-          </p:spPr>
-        </p:pic>
-        <p:cxnSp>
-          <p:nvCxnSpPr>
-            <p:cNvPr id="46" name="Connettore diritto 45">
-              <a:extLst>
-                <a:ext uri="{FF2B5EF4-FFF2-40B4-BE49-F238E27FC236}">
-                  <a16:creationId xmlns:a16="http://schemas.microsoft.com/office/drawing/2014/main" id="{84B15D3C-937C-FC6C-EACA-CC9A78494A49}"/>
-                </a:ext>
-              </a:extLst>
-            </p:cNvPr>
-            <p:cNvCxnSpPr>
-              <a:cxnSpLocks/>
-            </p:cNvCxnSpPr>
-            <p:nvPr/>
-          </p:nvCxnSpPr>
-          <p:spPr>
-            <a:xfrm>
-              <a:off x="7285041" y="4542957"/>
-              <a:ext cx="3575088" cy="9380"/>
-            </a:xfrm>
-            <a:prstGeom prst="line">
-              <a:avLst/>
-            </a:prstGeom>
-            <a:ln>
+            <a:extLst>
+              <a:ext uri="{C807C97D-BFC1-408E-A445-0C87EB9F89A2}">
+                <ask:lineSketchStyleProps xmlns:ask="http://schemas.microsoft.com/office/drawing/2018/sketchyshapes" sd="1481330856">
+                  <a:prstGeom prst="rect">
+                    <a:avLst/>
+                  </a:prstGeom>
+                  <ask:type>
+                    <ask:lineSketchScribble/>
+                  </ask:type>
+                </ask:lineSketchStyleProps>
+              </a:ext>
+            </a:extLst>
+          </a:ln>
+        </p:spPr>
+        <p:txBody>
+          <a:bodyPr wrap="square" rtlCol="0">
+            <a:normAutofit/>
+          </a:bodyPr>
+          <a:lstStyle/>
+          <a:p>
+            <a:r>
+              <a:rPr lang="it-IT" sz="1400" b="1" dirty="0">
+                <a:solidFill>
+                  <a:schemeClr val="bg1"/>
+                </a:solidFill>
+              </a:rPr>
+              <a:t>Categoria</a:t>
+            </a:r>
+          </a:p>
+        </p:txBody>
+      </p:sp>
+      <p:sp>
+        <p:nvSpPr>
+          <p:cNvPr id="38" name="CasellaDiTesto 37">
+            <a:extLst>
+              <a:ext uri="{FF2B5EF4-FFF2-40B4-BE49-F238E27FC236}">
+                <a16:creationId xmlns:a16="http://schemas.microsoft.com/office/drawing/2014/main" id="{6E2C127A-FE1E-42CE-9742-843A1765E519}"/>
+              </a:ext>
+            </a:extLst>
+          </p:cNvPr>
+          <p:cNvSpPr txBox="1">
+            <a:spLocks/>
+          </p:cNvSpPr>
+          <p:nvPr/>
+        </p:nvSpPr>
+        <p:spPr>
+          <a:xfrm>
+            <a:off x="690589" y="4993900"/>
+            <a:ext cx="734688" cy="276999"/>
+          </a:xfrm>
+          <a:prstGeom prst="rect">
+            <a:avLst/>
+          </a:prstGeom>
+          <a:noFill/>
+        </p:spPr>
+        <p:txBody>
+          <a:bodyPr wrap="none" rtlCol="0">
+            <a:spAutoFit/>
+          </a:bodyPr>
+          <a:lstStyle/>
+          <a:p>
+            <a:r>
+              <a:rPr lang="it-IT" sz="1200" b="1" dirty="0"/>
+              <a:t>Bevanda</a:t>
+            </a:r>
+            <a:endParaRPr lang="it-IT" sz="1600" b="1" dirty="0"/>
+          </a:p>
+        </p:txBody>
+      </p:sp>
+      <p:sp>
+        <p:nvSpPr>
+          <p:cNvPr id="16" name="Rettangolo con angoli arrotondati 15">
+            <a:extLst>
+              <a:ext uri="{FF2B5EF4-FFF2-40B4-BE49-F238E27FC236}">
+                <a16:creationId xmlns:a16="http://schemas.microsoft.com/office/drawing/2014/main" id="{F6D9A4E7-7F59-94CF-328C-BB97091BA84B}"/>
+              </a:ext>
+            </a:extLst>
+          </p:cNvPr>
+          <p:cNvSpPr>
+            <a:spLocks/>
+          </p:cNvSpPr>
+          <p:nvPr/>
+        </p:nvSpPr>
+        <p:spPr>
+          <a:xfrm>
+            <a:off x="903022" y="5501234"/>
+            <a:ext cx="122149" cy="102806"/>
+          </a:xfrm>
+          <a:prstGeom prst="roundRect">
+            <a:avLst/>
+          </a:prstGeom>
+          <a:ln/>
+        </p:spPr>
+        <p:style>
+          <a:lnRef idx="2">
+            <a:schemeClr val="accent3"/>
+          </a:lnRef>
+          <a:fillRef idx="1">
+            <a:schemeClr val="lt1"/>
+          </a:fillRef>
+          <a:effectRef idx="0">
+            <a:schemeClr val="accent3"/>
+          </a:effectRef>
+          <a:fontRef idx="minor">
+            <a:schemeClr val="dk1"/>
+          </a:fontRef>
+        </p:style>
+        <p:txBody>
+          <a:bodyPr rtlCol="0" anchor="ctr"/>
+          <a:lstStyle/>
+          <a:p>
+            <a:pPr algn="ctr"/>
+            <a:endParaRPr lang="it-IT" dirty="0"/>
+          </a:p>
+        </p:txBody>
+      </p:sp>
+      <p:sp>
+        <p:nvSpPr>
+          <p:cNvPr id="17" name="CasellaDiTesto 16">
+            <a:extLst>
+              <a:ext uri="{FF2B5EF4-FFF2-40B4-BE49-F238E27FC236}">
+                <a16:creationId xmlns:a16="http://schemas.microsoft.com/office/drawing/2014/main" id="{737F7374-6BBC-B874-759F-5048EAACC7BF}"/>
+              </a:ext>
+            </a:extLst>
+          </p:cNvPr>
+          <p:cNvSpPr txBox="1">
+            <a:spLocks/>
+          </p:cNvSpPr>
+          <p:nvPr/>
+        </p:nvSpPr>
+        <p:spPr>
+          <a:xfrm>
+            <a:off x="1117428" y="5427273"/>
+            <a:ext cx="784382" cy="276999"/>
+          </a:xfrm>
+          <a:prstGeom prst="rect">
+            <a:avLst/>
+          </a:prstGeom>
+          <a:noFill/>
+        </p:spPr>
+        <p:txBody>
+          <a:bodyPr wrap="none" rtlCol="0">
+            <a:spAutoFit/>
+          </a:bodyPr>
+          <a:lstStyle/>
+          <a:p>
+            <a:r>
+              <a:rPr lang="it-IT" sz="1200" dirty="0"/>
+              <a:t>Antipasto</a:t>
+            </a:r>
+            <a:endParaRPr lang="it-IT" sz="1600" dirty="0"/>
+          </a:p>
+        </p:txBody>
+      </p:sp>
+      <p:sp>
+        <p:nvSpPr>
+          <p:cNvPr id="31" name="CasellaDiTesto 30">
+            <a:extLst>
+              <a:ext uri="{FF2B5EF4-FFF2-40B4-BE49-F238E27FC236}">
+                <a16:creationId xmlns:a16="http://schemas.microsoft.com/office/drawing/2014/main" id="{DE27DA4D-FEBF-13CA-4EE1-70A3437EBD61}"/>
+              </a:ext>
+            </a:extLst>
+          </p:cNvPr>
+          <p:cNvSpPr txBox="1">
+            <a:spLocks/>
+          </p:cNvSpPr>
+          <p:nvPr/>
+        </p:nvSpPr>
+        <p:spPr>
+          <a:xfrm>
+            <a:off x="690589" y="5248277"/>
+            <a:ext cx="471604" cy="276999"/>
+          </a:xfrm>
+          <a:prstGeom prst="rect">
+            <a:avLst/>
+          </a:prstGeom>
+          <a:noFill/>
+        </p:spPr>
+        <p:txBody>
+          <a:bodyPr wrap="none" rtlCol="0">
+            <a:spAutoFit/>
+          </a:bodyPr>
+          <a:lstStyle/>
+          <a:p>
+            <a:r>
+              <a:rPr lang="it-IT" sz="1200" b="1" dirty="0">
+                <a:solidFill>
+                  <a:schemeClr val="accent2">
+                    <a:lumMod val="50000"/>
+                  </a:schemeClr>
+                </a:solidFill>
+              </a:rPr>
+              <a:t>Cibo</a:t>
+            </a:r>
+            <a:endParaRPr lang="it-IT" sz="1600" b="1" dirty="0">
               <a:solidFill>
                 <a:schemeClr val="accent2">
                   <a:lumMod val="50000"/>
                 </a:schemeClr>
               </a:solidFill>
-            </a:ln>
-          </p:spPr>
-          <p:style>
-            <a:lnRef idx="1">
-              <a:schemeClr val="accent5"/>
-            </a:lnRef>
-            <a:fillRef idx="0">
-              <a:schemeClr val="accent5"/>
-            </a:fillRef>
-            <a:effectRef idx="0">
-              <a:schemeClr val="accent5"/>
-            </a:effectRef>
-            <a:fontRef idx="minor">
-              <a:schemeClr val="tx1"/>
-            </a:fontRef>
-          </p:style>
-        </p:cxnSp>
-      </p:grpSp>
+            </a:endParaRPr>
+          </a:p>
+        </p:txBody>
+      </p:sp>
+      <p:sp>
+        <p:nvSpPr>
+          <p:cNvPr id="47" name="Rettangolo con angoli arrotondati 46">
+            <a:extLst>
+              <a:ext uri="{FF2B5EF4-FFF2-40B4-BE49-F238E27FC236}">
+                <a16:creationId xmlns:a16="http://schemas.microsoft.com/office/drawing/2014/main" id="{63F1A774-89E6-6AC2-8500-84E896AC25BA}"/>
+              </a:ext>
+            </a:extLst>
+          </p:cNvPr>
+          <p:cNvSpPr>
+            <a:spLocks/>
+          </p:cNvSpPr>
+          <p:nvPr/>
+        </p:nvSpPr>
+        <p:spPr>
+          <a:xfrm>
+            <a:off x="903022" y="5678923"/>
+            <a:ext cx="122149" cy="102806"/>
+          </a:xfrm>
+          <a:prstGeom prst="roundRect">
+            <a:avLst/>
+          </a:prstGeom>
+          <a:ln/>
+        </p:spPr>
+        <p:style>
+          <a:lnRef idx="2">
+            <a:schemeClr val="accent3"/>
+          </a:lnRef>
+          <a:fillRef idx="1">
+            <a:schemeClr val="lt1"/>
+          </a:fillRef>
+          <a:effectRef idx="0">
+            <a:schemeClr val="accent3"/>
+          </a:effectRef>
+          <a:fontRef idx="minor">
+            <a:schemeClr val="dk1"/>
+          </a:fontRef>
+        </p:style>
+        <p:txBody>
+          <a:bodyPr rtlCol="0" anchor="ctr"/>
+          <a:lstStyle/>
+          <a:p>
+            <a:pPr algn="ctr"/>
+            <a:endParaRPr lang="it-IT" dirty="0"/>
+          </a:p>
+        </p:txBody>
+      </p:sp>
+      <p:sp>
+        <p:nvSpPr>
+          <p:cNvPr id="48" name="CasellaDiTesto 47">
+            <a:extLst>
+              <a:ext uri="{FF2B5EF4-FFF2-40B4-BE49-F238E27FC236}">
+                <a16:creationId xmlns:a16="http://schemas.microsoft.com/office/drawing/2014/main" id="{BD5637AA-C45F-7F47-7C41-4ADEA74E3F16}"/>
+              </a:ext>
+            </a:extLst>
+          </p:cNvPr>
+          <p:cNvSpPr txBox="1">
+            <a:spLocks/>
+          </p:cNvSpPr>
+          <p:nvPr/>
+        </p:nvSpPr>
+        <p:spPr>
+          <a:xfrm>
+            <a:off x="1117428" y="5604962"/>
+            <a:ext cx="558166" cy="276999"/>
+          </a:xfrm>
+          <a:prstGeom prst="rect">
+            <a:avLst/>
+          </a:prstGeom>
+          <a:noFill/>
+        </p:spPr>
+        <p:txBody>
+          <a:bodyPr wrap="none" rtlCol="0">
+            <a:spAutoFit/>
+          </a:bodyPr>
+          <a:lstStyle/>
+          <a:p>
+            <a:r>
+              <a:rPr lang="it-IT" sz="1200" dirty="0"/>
+              <a:t>Primo</a:t>
+            </a:r>
+            <a:endParaRPr lang="it-IT" sz="1600" dirty="0"/>
+          </a:p>
+        </p:txBody>
+      </p:sp>
+      <p:sp>
+        <p:nvSpPr>
+          <p:cNvPr id="55" name="Rettangolo con angoli arrotondati 54">
+            <a:extLst>
+              <a:ext uri="{FF2B5EF4-FFF2-40B4-BE49-F238E27FC236}">
+                <a16:creationId xmlns:a16="http://schemas.microsoft.com/office/drawing/2014/main" id="{FB4118B8-F957-8815-023B-EADE1CF572A3}"/>
+              </a:ext>
+            </a:extLst>
+          </p:cNvPr>
+          <p:cNvSpPr>
+            <a:spLocks/>
+          </p:cNvSpPr>
+          <p:nvPr/>
+        </p:nvSpPr>
+        <p:spPr>
+          <a:xfrm>
+            <a:off x="903022" y="5860009"/>
+            <a:ext cx="122149" cy="102806"/>
+          </a:xfrm>
+          <a:prstGeom prst="roundRect">
+            <a:avLst/>
+          </a:prstGeom>
+          <a:ln/>
+        </p:spPr>
+        <p:style>
+          <a:lnRef idx="2">
+            <a:schemeClr val="accent3"/>
+          </a:lnRef>
+          <a:fillRef idx="1">
+            <a:schemeClr val="lt1"/>
+          </a:fillRef>
+          <a:effectRef idx="0">
+            <a:schemeClr val="accent3"/>
+          </a:effectRef>
+          <a:fontRef idx="minor">
+            <a:schemeClr val="dk1"/>
+          </a:fontRef>
+        </p:style>
+        <p:txBody>
+          <a:bodyPr rtlCol="0" anchor="ctr"/>
+          <a:lstStyle/>
+          <a:p>
+            <a:pPr algn="ctr"/>
+            <a:endParaRPr lang="it-IT" dirty="0"/>
+          </a:p>
+        </p:txBody>
+      </p:sp>
+      <p:sp>
+        <p:nvSpPr>
+          <p:cNvPr id="56" name="CasellaDiTesto 55">
+            <a:extLst>
+              <a:ext uri="{FF2B5EF4-FFF2-40B4-BE49-F238E27FC236}">
+                <a16:creationId xmlns:a16="http://schemas.microsoft.com/office/drawing/2014/main" id="{525E88C2-DF2D-0403-72EE-0F89DB02D079}"/>
+              </a:ext>
+            </a:extLst>
+          </p:cNvPr>
+          <p:cNvSpPr txBox="1">
+            <a:spLocks/>
+          </p:cNvSpPr>
+          <p:nvPr/>
+        </p:nvSpPr>
+        <p:spPr>
+          <a:xfrm>
+            <a:off x="1117428" y="5786048"/>
+            <a:ext cx="720390" cy="276999"/>
+          </a:xfrm>
+          <a:prstGeom prst="rect">
+            <a:avLst/>
+          </a:prstGeom>
+          <a:noFill/>
+        </p:spPr>
+        <p:txBody>
+          <a:bodyPr wrap="none" rtlCol="0">
+            <a:spAutoFit/>
+          </a:bodyPr>
+          <a:lstStyle/>
+          <a:p>
+            <a:r>
+              <a:rPr lang="it-IT" sz="1200" dirty="0"/>
+              <a:t>Secondo</a:t>
+            </a:r>
+            <a:endParaRPr lang="it-IT" sz="1600" dirty="0"/>
+          </a:p>
+        </p:txBody>
+      </p:sp>
+      <p:sp>
+        <p:nvSpPr>
+          <p:cNvPr id="57" name="Rettangolo con angoli arrotondati 56">
+            <a:extLst>
+              <a:ext uri="{FF2B5EF4-FFF2-40B4-BE49-F238E27FC236}">
+                <a16:creationId xmlns:a16="http://schemas.microsoft.com/office/drawing/2014/main" id="{1FB11982-063F-DF8B-06F0-D99E2A52611A}"/>
+              </a:ext>
+            </a:extLst>
+          </p:cNvPr>
+          <p:cNvSpPr>
+            <a:spLocks/>
+          </p:cNvSpPr>
+          <p:nvPr/>
+        </p:nvSpPr>
+        <p:spPr>
+          <a:xfrm>
+            <a:off x="903022" y="6037698"/>
+            <a:ext cx="122149" cy="102806"/>
+          </a:xfrm>
+          <a:prstGeom prst="roundRect">
+            <a:avLst/>
+          </a:prstGeom>
+          <a:ln/>
+        </p:spPr>
+        <p:style>
+          <a:lnRef idx="2">
+            <a:schemeClr val="accent3"/>
+          </a:lnRef>
+          <a:fillRef idx="1">
+            <a:schemeClr val="lt1"/>
+          </a:fillRef>
+          <a:effectRef idx="0">
+            <a:schemeClr val="accent3"/>
+          </a:effectRef>
+          <a:fontRef idx="minor">
+            <a:schemeClr val="dk1"/>
+          </a:fontRef>
+        </p:style>
+        <p:txBody>
+          <a:bodyPr rtlCol="0" anchor="ctr"/>
+          <a:lstStyle/>
+          <a:p>
+            <a:pPr algn="ctr"/>
+            <a:endParaRPr lang="it-IT" dirty="0"/>
+          </a:p>
+        </p:txBody>
+      </p:sp>
+      <p:sp>
+        <p:nvSpPr>
+          <p:cNvPr id="58" name="CasellaDiTesto 57">
+            <a:extLst>
+              <a:ext uri="{FF2B5EF4-FFF2-40B4-BE49-F238E27FC236}">
+                <a16:creationId xmlns:a16="http://schemas.microsoft.com/office/drawing/2014/main" id="{A84791F5-2CAD-AADD-1FC6-1C225104B930}"/>
+              </a:ext>
+            </a:extLst>
+          </p:cNvPr>
+          <p:cNvSpPr txBox="1">
+            <a:spLocks/>
+          </p:cNvSpPr>
+          <p:nvPr/>
+        </p:nvSpPr>
+        <p:spPr>
+          <a:xfrm>
+            <a:off x="1117428" y="5963737"/>
+            <a:ext cx="773289" cy="276999"/>
+          </a:xfrm>
+          <a:prstGeom prst="rect">
+            <a:avLst/>
+          </a:prstGeom>
+          <a:noFill/>
+        </p:spPr>
+        <p:txBody>
+          <a:bodyPr wrap="none" rtlCol="0">
+            <a:spAutoFit/>
+          </a:bodyPr>
+          <a:lstStyle/>
+          <a:p>
+            <a:r>
+              <a:rPr lang="it-IT" sz="1200" dirty="0"/>
+              <a:t>Contorno</a:t>
+            </a:r>
+            <a:endParaRPr lang="it-IT" sz="1600" dirty="0"/>
+          </a:p>
+        </p:txBody>
+      </p:sp>
+      <p:sp>
+        <p:nvSpPr>
+          <p:cNvPr id="59" name="Rettangolo con angoli arrotondati 58">
+            <a:extLst>
+              <a:ext uri="{FF2B5EF4-FFF2-40B4-BE49-F238E27FC236}">
+                <a16:creationId xmlns:a16="http://schemas.microsoft.com/office/drawing/2014/main" id="{BB7F68B4-80FD-73A0-81CA-8E9AF886230C}"/>
+              </a:ext>
+            </a:extLst>
+          </p:cNvPr>
+          <p:cNvSpPr>
+            <a:spLocks/>
+          </p:cNvSpPr>
+          <p:nvPr/>
+        </p:nvSpPr>
+        <p:spPr>
+          <a:xfrm>
+            <a:off x="903022" y="6215288"/>
+            <a:ext cx="122149" cy="102806"/>
+          </a:xfrm>
+          <a:prstGeom prst="roundRect">
+            <a:avLst/>
+          </a:prstGeom>
+          <a:ln/>
+        </p:spPr>
+        <p:style>
+          <a:lnRef idx="2">
+            <a:schemeClr val="accent3"/>
+          </a:lnRef>
+          <a:fillRef idx="1">
+            <a:schemeClr val="lt1"/>
+          </a:fillRef>
+          <a:effectRef idx="0">
+            <a:schemeClr val="accent3"/>
+          </a:effectRef>
+          <a:fontRef idx="minor">
+            <a:schemeClr val="dk1"/>
+          </a:fontRef>
+        </p:style>
+        <p:txBody>
+          <a:bodyPr rtlCol="0" anchor="ctr"/>
+          <a:lstStyle/>
+          <a:p>
+            <a:pPr algn="ctr"/>
+            <a:endParaRPr lang="it-IT" dirty="0"/>
+          </a:p>
+        </p:txBody>
+      </p:sp>
+      <p:sp>
+        <p:nvSpPr>
+          <p:cNvPr id="60" name="CasellaDiTesto 59">
+            <a:extLst>
+              <a:ext uri="{FF2B5EF4-FFF2-40B4-BE49-F238E27FC236}">
+                <a16:creationId xmlns:a16="http://schemas.microsoft.com/office/drawing/2014/main" id="{4BB67F74-9F5D-3726-1031-28A99C04F67A}"/>
+              </a:ext>
+            </a:extLst>
+          </p:cNvPr>
+          <p:cNvSpPr txBox="1">
+            <a:spLocks/>
+          </p:cNvSpPr>
+          <p:nvPr/>
+        </p:nvSpPr>
+        <p:spPr>
+          <a:xfrm>
+            <a:off x="1117428" y="6141327"/>
+            <a:ext cx="930126" cy="276999"/>
+          </a:xfrm>
+          <a:prstGeom prst="rect">
+            <a:avLst/>
+          </a:prstGeom>
+          <a:noFill/>
+        </p:spPr>
+        <p:txBody>
+          <a:bodyPr wrap="none" rtlCol="0">
+            <a:spAutoFit/>
+          </a:bodyPr>
+          <a:lstStyle/>
+          <a:p>
+            <a:r>
+              <a:rPr lang="it-IT" sz="1200" dirty="0"/>
+              <a:t>Piatto unico</a:t>
+            </a:r>
+            <a:endParaRPr lang="it-IT" sz="1600" dirty="0"/>
+          </a:p>
+        </p:txBody>
+      </p:sp>
+      <p:pic>
+        <p:nvPicPr>
+          <p:cNvPr id="9" name="Elemento grafico 8" descr="Accento circonflesso verso il basso con riempimento a tinta unita">
+            <a:extLst>
+              <a:ext uri="{FF2B5EF4-FFF2-40B4-BE49-F238E27FC236}">
+                <a16:creationId xmlns:a16="http://schemas.microsoft.com/office/drawing/2014/main" id="{BC6433CF-1906-4E8D-3FB7-9145456FE6A1}"/>
+              </a:ext>
+            </a:extLst>
+          </p:cNvPr>
+          <p:cNvPicPr>
+            <a:picLocks noChangeAspect="1"/>
+          </p:cNvPicPr>
+          <p:nvPr/>
+        </p:nvPicPr>
+        <p:blipFill>
+          <a:blip r:embed="rId6">
+            <a:extLst>
+              <a:ext uri="{28A0092B-C50C-407E-A947-70E740481C1C}">
+                <a14:useLocalDpi xmlns:a14="http://schemas.microsoft.com/office/drawing/2010/main" val="0"/>
+              </a:ext>
+              <a:ext uri="{96DAC541-7B7A-43D3-8B79-37D633B846F1}">
+                <asvg:svgBlip xmlns:asvg="http://schemas.microsoft.com/office/drawing/2016/SVG/main" r:embed="rId7"/>
+              </a:ext>
+            </a:extLst>
+          </a:blip>
+          <a:stretch>
+            <a:fillRect/>
+          </a:stretch>
+        </p:blipFill>
+        <p:spPr>
+          <a:xfrm>
+            <a:off x="1950017" y="5026264"/>
+            <a:ext cx="252336" cy="252336"/>
+          </a:xfrm>
+          <a:prstGeom prst="rect">
+            <a:avLst/>
+          </a:prstGeom>
+        </p:spPr>
+      </p:pic>
+      <p:pic>
+        <p:nvPicPr>
+          <p:cNvPr id="32" name="Elemento grafico 31" descr="Accento circonflesso verso il basso con riempimento a tinta unita">
+            <a:extLst>
+              <a:ext uri="{FF2B5EF4-FFF2-40B4-BE49-F238E27FC236}">
+                <a16:creationId xmlns:a16="http://schemas.microsoft.com/office/drawing/2014/main" id="{ED2641BD-7603-5AB4-B959-9C1C1DEBA609}"/>
+              </a:ext>
+            </a:extLst>
+          </p:cNvPr>
+          <p:cNvPicPr>
+            <a:picLocks noChangeAspect="1"/>
+          </p:cNvPicPr>
+          <p:nvPr/>
+        </p:nvPicPr>
+        <p:blipFill>
+          <a:blip r:embed="rId8">
+            <a:extLst>
+              <a:ext uri="{28A0092B-C50C-407E-A947-70E740481C1C}">
+                <a14:useLocalDpi xmlns:a14="http://schemas.microsoft.com/office/drawing/2010/main" val="0"/>
+              </a:ext>
+              <a:ext uri="{96DAC541-7B7A-43D3-8B79-37D633B846F1}">
+                <asvg:svgBlip xmlns:asvg="http://schemas.microsoft.com/office/drawing/2016/SVG/main" r:embed="rId9"/>
+              </a:ext>
+            </a:extLst>
+          </a:blip>
+          <a:stretch>
+            <a:fillRect/>
+          </a:stretch>
+        </p:blipFill>
+        <p:spPr>
+          <a:xfrm rot="10800000">
+            <a:off x="1950017" y="5280641"/>
+            <a:ext cx="252336" cy="252336"/>
+          </a:xfrm>
+          <a:prstGeom prst="rect">
+            <a:avLst/>
+          </a:prstGeom>
+        </p:spPr>
+      </p:pic>
+      <p:cxnSp>
+        <p:nvCxnSpPr>
+          <p:cNvPr id="46" name="Connettore diritto 45">
+            <a:extLst>
+              <a:ext uri="{FF2B5EF4-FFF2-40B4-BE49-F238E27FC236}">
+                <a16:creationId xmlns:a16="http://schemas.microsoft.com/office/drawing/2014/main" id="{84B15D3C-937C-FC6C-EACA-CC9A78494A49}"/>
+              </a:ext>
+            </a:extLst>
+          </p:cNvPr>
+          <p:cNvCxnSpPr>
+            <a:cxnSpLocks/>
+          </p:cNvCxnSpPr>
+          <p:nvPr/>
+        </p:nvCxnSpPr>
+        <p:spPr>
+          <a:xfrm>
+            <a:off x="592809" y="5269220"/>
+            <a:ext cx="3575088" cy="9380"/>
+          </a:xfrm>
+          <a:prstGeom prst="line">
+            <a:avLst/>
+          </a:prstGeom>
+          <a:ln>
+            <a:solidFill>
+              <a:schemeClr val="accent2">
+                <a:lumMod val="50000"/>
+              </a:schemeClr>
+            </a:solidFill>
+          </a:ln>
+        </p:spPr>
+        <p:style>
+          <a:lnRef idx="1">
+            <a:schemeClr val="accent5"/>
+          </a:lnRef>
+          <a:fillRef idx="0">
+            <a:schemeClr val="accent5"/>
+          </a:fillRef>
+          <a:effectRef idx="0">
+            <a:schemeClr val="accent5"/>
+          </a:effectRef>
+          <a:fontRef idx="minor">
+            <a:schemeClr val="tx1"/>
+          </a:fontRef>
+        </p:style>
+      </p:cxnSp>
       <p:grpSp>
         <p:nvGrpSpPr>
           <p:cNvPr id="20" name="Gruppo 19">
@@ -15271,7 +15307,7 @@
             <p:nvPr>
               <p:extLst>
                 <p:ext uri="{D42A27DB-BD31-4B8C-83A1-F6EECF244321}">
-                  <p14:modId xmlns:p14="http://schemas.microsoft.com/office/powerpoint/2010/main" val="1243488357"/>
+                  <p14:modId xmlns:p14="http://schemas.microsoft.com/office/powerpoint/2010/main" val="3481151264"/>
                 </p:ext>
               </p:extLst>
             </p:nvPr>
@@ -15650,6 +15686,91 @@
           </p:txBody>
         </p:sp>
       </p:grpSp>
+      <p:sp>
+        <p:nvSpPr>
+          <p:cNvPr id="8" name="Rettangolo con angoli arrotondati 7">
+            <a:extLst>
+              <a:ext uri="{FF2B5EF4-FFF2-40B4-BE49-F238E27FC236}">
+                <a16:creationId xmlns:a16="http://schemas.microsoft.com/office/drawing/2014/main" id="{36977242-8D2D-75FB-F10E-F50CD42194A9}"/>
+              </a:ext>
+            </a:extLst>
+          </p:cNvPr>
+          <p:cNvSpPr>
+            <a:spLocks/>
+          </p:cNvSpPr>
+          <p:nvPr/>
+        </p:nvSpPr>
+        <p:spPr>
+          <a:xfrm>
+            <a:off x="903022" y="6397994"/>
+            <a:ext cx="122149" cy="102806"/>
+          </a:xfrm>
+          <a:prstGeom prst="roundRect">
+            <a:avLst/>
+          </a:prstGeom>
+          <a:ln/>
+        </p:spPr>
+        <p:style>
+          <a:lnRef idx="2">
+            <a:schemeClr val="accent3"/>
+          </a:lnRef>
+          <a:fillRef idx="1">
+            <a:schemeClr val="lt1"/>
+          </a:fillRef>
+          <a:effectRef idx="0">
+            <a:schemeClr val="accent3"/>
+          </a:effectRef>
+          <a:fontRef idx="minor">
+            <a:schemeClr val="dk1"/>
+          </a:fontRef>
+        </p:style>
+        <p:txBody>
+          <a:bodyPr rtlCol="0" anchor="ctr"/>
+          <a:lstStyle/>
+          <a:p>
+            <a:pPr algn="ctr"/>
+            <a:endParaRPr lang="it-IT" dirty="0"/>
+          </a:p>
+        </p:txBody>
+      </p:sp>
+      <p:sp>
+        <p:nvSpPr>
+          <p:cNvPr id="10" name="CasellaDiTesto 9">
+            <a:extLst>
+              <a:ext uri="{FF2B5EF4-FFF2-40B4-BE49-F238E27FC236}">
+                <a16:creationId xmlns:a16="http://schemas.microsoft.com/office/drawing/2014/main" id="{6A27A44D-FACF-7557-49C4-ED02C373C122}"/>
+              </a:ext>
+            </a:extLst>
+          </p:cNvPr>
+          <p:cNvSpPr txBox="1">
+            <a:spLocks/>
+          </p:cNvSpPr>
+          <p:nvPr/>
+        </p:nvSpPr>
+        <p:spPr>
+          <a:xfrm>
+            <a:off x="1117428" y="6324033"/>
+            <a:ext cx="659155" cy="276999"/>
+          </a:xfrm>
+          <a:prstGeom prst="rect">
+            <a:avLst/>
+          </a:prstGeom>
+          <a:noFill/>
+        </p:spPr>
+        <p:txBody>
+          <a:bodyPr wrap="none" rtlCol="0">
+            <a:spAutoFit/>
+          </a:bodyPr>
+          <a:lstStyle/>
+          <a:p>
+            <a:r>
+              <a:rPr lang="it-IT" sz="1200" dirty="0"/>
+              <a:t>Dessert</a:t>
+            </a:r>
+            <a:endParaRPr lang="it-IT" sz="1400" dirty="0"/>
+          </a:p>
+        </p:txBody>
+      </p:sp>
     </p:spTree>
     <p:extLst>
       <p:ext uri="{BB962C8B-B14F-4D97-AF65-F5344CB8AC3E}">

</xml_diff>

<commit_message>
Definiti diagrammi per UC Add dish; completate le mie storyboards, riferite agli UC Add dish e Manage missing ingredient report
</commit_message>
<xml_diff>
--- a/2 Storyboards/Storyboard - Add dish.pptx
+++ b/2 Storyboards/Storyboard - Add dish.pptx
@@ -2524,31 +2524,7 @@
                 </a:schemeClr>
               </a:solidFill>
             </a:rPr>
-            <a:t>Cereali contenenti glutine </a:t>
-          </a:r>
-          <a:r>
-            <a:rPr lang="it-IT" sz="1200">
-              <a:solidFill>
-                <a:schemeClr val="dk1">
-                  <a:hueOff val="0"/>
-                  <a:satOff val="0"/>
-                  <a:lumOff val="0"/>
-                </a:schemeClr>
-              </a:solidFill>
-            </a:rPr>
-            <a:t>e prodotti </a:t>
-          </a:r>
-          <a:r>
-            <a:rPr lang="it-IT" sz="1200" dirty="0">
-              <a:solidFill>
-                <a:schemeClr val="dk1">
-                  <a:hueOff val="0"/>
-                  <a:satOff val="0"/>
-                  <a:lumOff val="0"/>
-                </a:schemeClr>
-              </a:solidFill>
-            </a:rPr>
-            <a:t>derivati</a:t>
+            <a:t>Cereali contenenti glutine e prodotti derivati</a:t>
           </a:r>
         </a:p>
       </dgm:t>
@@ -2601,55 +2577,6 @@
       </dgm:t>
     </dgm:pt>
     <dgm:pt modelId="{24950D9D-C797-4876-8F64-C13AC3960C8E}" type="sibTrans" cxnId="{4D0E3B83-6833-441A-8118-96718D68C6AA}">
-      <dgm:prSet/>
-      <dgm:spPr/>
-      <dgm:t>
-        <a:bodyPr/>
-        <a:lstStyle/>
-        <a:p>
-          <a:endParaRPr lang="it-IT" sz="1400"/>
-        </a:p>
-      </dgm:t>
-    </dgm:pt>
-    <dgm:pt modelId="{508B34B0-8822-4B9D-8509-C86242B3F0FC}">
-      <dgm:prSet phldrT="[Testo]" custT="1"/>
-      <dgm:spPr>
-        <a:solidFill>
-          <a:schemeClr val="accent2">
-            <a:lumMod val="40000"/>
-            <a:lumOff val="60000"/>
-          </a:schemeClr>
-        </a:solidFill>
-      </dgm:spPr>
-      <dgm:t>
-        <a:bodyPr/>
-        <a:lstStyle/>
-        <a:p>
-          <a:r>
-            <a:rPr lang="it-IT" sz="1200" b="1" dirty="0">
-              <a:solidFill>
-                <a:schemeClr val="accent2">
-                  <a:lumMod val="50000"/>
-                </a:schemeClr>
-              </a:solidFill>
-            </a:rPr>
-            <a:t>+ Aggiungi allergene</a:t>
-          </a:r>
-        </a:p>
-      </dgm:t>
-    </dgm:pt>
-    <dgm:pt modelId="{EAFBB4BE-EB34-4DE9-B37A-E90832B60FFA}" type="parTrans" cxnId="{B7E32D36-B923-43E1-B2CE-694DD99F3081}">
-      <dgm:prSet/>
-      <dgm:spPr/>
-      <dgm:t>
-        <a:bodyPr/>
-        <a:lstStyle/>
-        <a:p>
-          <a:endParaRPr lang="it-IT" sz="1400"/>
-        </a:p>
-      </dgm:t>
-    </dgm:pt>
-    <dgm:pt modelId="{46A9A74D-28EB-459B-B131-E8A65D94C2ED}" type="sibTrans" cxnId="{B7E32D36-B923-43E1-B2CE-694DD99F3081}">
       <dgm:prSet/>
       <dgm:spPr/>
       <dgm:t>
@@ -3531,7 +3458,7 @@
       <dgm:spPr/>
     </dgm:pt>
     <dgm:pt modelId="{2E63C274-9DA8-45B8-82CD-443D3F0D4117}" type="pres">
-      <dgm:prSet presAssocID="{FFB3B67C-1440-48A0-8A3C-215F535DAEB6}" presName="parentText" presStyleLbl="node1" presStyleIdx="0" presStyleCnt="4" custLinFactY="-68734" custLinFactNeighborX="-2184" custLinFactNeighborY="-100000">
+      <dgm:prSet presAssocID="{FFB3B67C-1440-48A0-8A3C-215F535DAEB6}" presName="parentText" presStyleLbl="node1" presStyleIdx="0" presStyleCnt="3" custLinFactY="-68734" custLinFactNeighborX="-2184" custLinFactNeighborY="-100000">
         <dgm:presLayoutVars>
           <dgm:chMax val="0"/>
           <dgm:bulletEnabled val="1"/>
@@ -3544,7 +3471,7 @@
       <dgm:spPr/>
     </dgm:pt>
     <dgm:pt modelId="{588B54E1-05A8-4440-8F0D-96AD752098A3}" type="pres">
-      <dgm:prSet presAssocID="{6EA496EA-1116-4392-82B2-3ABB000E63A9}" presName="parentText" presStyleLbl="node1" presStyleIdx="1" presStyleCnt="4">
+      <dgm:prSet presAssocID="{6EA496EA-1116-4392-82B2-3ABB000E63A9}" presName="parentText" presStyleLbl="node1" presStyleIdx="1" presStyleCnt="3">
         <dgm:presLayoutVars>
           <dgm:chMax val="0"/>
           <dgm:bulletEnabled val="1"/>
@@ -3557,7 +3484,7 @@
       <dgm:spPr/>
     </dgm:pt>
     <dgm:pt modelId="{920EF786-34AE-4CDF-83CF-7A159AE4B3C9}" type="pres">
-      <dgm:prSet presAssocID="{A0DAAF04-7AA3-4F22-9190-45111789109B}" presName="parentText" presStyleLbl="node1" presStyleIdx="2" presStyleCnt="4">
+      <dgm:prSet presAssocID="{A0DAAF04-7AA3-4F22-9190-45111789109B}" presName="parentText" presStyleLbl="node1" presStyleIdx="2" presStyleCnt="3">
         <dgm:presLayoutVars>
           <dgm:chMax val="0"/>
           <dgm:bulletEnabled val="1"/>
@@ -3568,15 +3495,6 @@
     <dgm:pt modelId="{07C4600B-39FA-46BA-A953-69A47F2CFAAA}" type="pres">
       <dgm:prSet presAssocID="{A0DAAF04-7AA3-4F22-9190-45111789109B}" presName="childText" presStyleLbl="revTx" presStyleIdx="0" presStyleCnt="1">
         <dgm:presLayoutVars>
-          <dgm:bulletEnabled val="1"/>
-        </dgm:presLayoutVars>
-      </dgm:prSet>
-      <dgm:spPr/>
-    </dgm:pt>
-    <dgm:pt modelId="{A04F6C91-AEBF-4847-980F-C23A5906DCBB}" type="pres">
-      <dgm:prSet presAssocID="{508B34B0-8822-4B9D-8509-C86242B3F0FC}" presName="parentText" presStyleLbl="node1" presStyleIdx="3" presStyleCnt="4" custLinFactY="140631" custLinFactNeighborX="745" custLinFactNeighborY="200000">
-        <dgm:presLayoutVars>
-          <dgm:chMax val="0"/>
           <dgm:bulletEnabled val="1"/>
         </dgm:presLayoutVars>
       </dgm:prSet>
@@ -3594,7 +3512,6 @@
     <dgm:cxn modelId="{0CBEEE25-9303-4605-B24B-CF6BD72576DD}" srcId="{A0DAAF04-7AA3-4F22-9190-45111789109B}" destId="{E1B43E14-8216-4550-8E33-3EC59F2423CE}" srcOrd="20" destOrd="0" parTransId="{669E2B12-3987-4C45-9E46-4263F458446D}" sibTransId="{779BBC1F-08BE-415F-8ADA-BDBB9A58E67C}"/>
     <dgm:cxn modelId="{EE4FFC30-0341-40FE-A06C-D0EA27CF6D28}" type="presOf" srcId="{A41F902F-C66D-488A-8DD8-597A3019E2C7}" destId="{07C4600B-39FA-46BA-A953-69A47F2CFAAA}" srcOrd="0" destOrd="23" presId="urn:microsoft.com/office/officeart/2005/8/layout/vList2"/>
     <dgm:cxn modelId="{8C07B635-4C76-4BC1-A3B5-4F0B7DC38D29}" type="presOf" srcId="{D6C1D3AC-4E1E-4207-AAF3-48F6286EB818}" destId="{07C4600B-39FA-46BA-A953-69A47F2CFAAA}" srcOrd="0" destOrd="17" presId="urn:microsoft.com/office/officeart/2005/8/layout/vList2"/>
-    <dgm:cxn modelId="{B7E32D36-B923-43E1-B2CE-694DD99F3081}" srcId="{901C6586-BCBD-4CE4-9830-89F1D9B4AE5F}" destId="{508B34B0-8822-4B9D-8509-C86242B3F0FC}" srcOrd="3" destOrd="0" parTransId="{EAFBB4BE-EB34-4DE9-B37A-E90832B60FFA}" sibTransId="{46A9A74D-28EB-459B-B131-E8A65D94C2ED}"/>
     <dgm:cxn modelId="{98D9C03C-5D24-47D0-B701-664E30C10D17}" type="presOf" srcId="{FAF025BF-D22F-4618-A1C6-B73B104074E3}" destId="{07C4600B-39FA-46BA-A953-69A47F2CFAAA}" srcOrd="0" destOrd="16" presId="urn:microsoft.com/office/officeart/2005/8/layout/vList2"/>
     <dgm:cxn modelId="{8F1BB440-FCE1-410A-833B-35AB93E1E2C9}" srcId="{A0DAAF04-7AA3-4F22-9190-45111789109B}" destId="{BCE0415A-EA7E-43E6-B296-E823DA52C3E7}" srcOrd="2" destOrd="0" parTransId="{6C02ED2E-FE65-49F0-A336-729CC8871527}" sibTransId="{D4C4395D-AE35-4042-ADF9-3FAD159F2FB1}"/>
     <dgm:cxn modelId="{01E1DA61-20FA-4656-B020-7182F6EA12FC}" srcId="{A0DAAF04-7AA3-4F22-9190-45111789109B}" destId="{0112AADC-B90B-4409-886C-74D8914FBA90}" srcOrd="18" destOrd="0" parTransId="{663FE461-EB55-422D-82D0-C92AFF7A0F6A}" sibTransId="{3F358168-077C-4822-934A-1E887F958ECA}"/>
@@ -3628,7 +3545,6 @@
     <dgm:cxn modelId="{3FA983B9-A930-4FF4-8E8C-98B7DCBB0293}" type="presOf" srcId="{3C9D5C68-6FCA-4A10-980A-33E11658865B}" destId="{07C4600B-39FA-46BA-A953-69A47F2CFAAA}" srcOrd="0" destOrd="9" presId="urn:microsoft.com/office/officeart/2005/8/layout/vList2"/>
     <dgm:cxn modelId="{FD660CBE-2CF5-42EC-8AF9-679D895F3C81}" srcId="{A0DAAF04-7AA3-4F22-9190-45111789109B}" destId="{C34A7D7A-9576-4FF6-A2D7-6570D2CE2B8A}" srcOrd="0" destOrd="0" parTransId="{B0B94145-BE76-470E-8FFD-BB60C4FCD4CA}" sibTransId="{07B86293-2F6E-4101-A11D-426BDDC0EA25}"/>
     <dgm:cxn modelId="{D9EF36C3-A46A-4E11-B4C0-6A628044D227}" srcId="{A0DAAF04-7AA3-4F22-9190-45111789109B}" destId="{BFB50813-E4F9-4251-A4BC-99F4EBDB6D0F}" srcOrd="5" destOrd="0" parTransId="{C09961B3-4796-43AE-96C7-E2854E4E95D7}" sibTransId="{FBA3D7A3-4780-4F1C-855F-2AD9D20B7032}"/>
-    <dgm:cxn modelId="{B9487BC8-723F-4399-9032-A115D4BA276C}" type="presOf" srcId="{508B34B0-8822-4B9D-8509-C86242B3F0FC}" destId="{A04F6C91-AEBF-4847-980F-C23A5906DCBB}" srcOrd="0" destOrd="0" presId="urn:microsoft.com/office/officeart/2005/8/layout/vList2"/>
     <dgm:cxn modelId="{1243DCC8-42AD-49AA-93E8-F1C1AD188C30}" srcId="{A0DAAF04-7AA3-4F22-9190-45111789109B}" destId="{D638AB69-7239-4385-87A9-010C4FF9B007}" srcOrd="10" destOrd="0" parTransId="{3E83447B-1AB4-451A-A1A6-3ABD965CF691}" sibTransId="{2B2FE155-865C-4F6B-9B2B-8548AC163E2E}"/>
     <dgm:cxn modelId="{A96476CA-D1B5-44F9-9949-520AD7303805}" srcId="{A0DAAF04-7AA3-4F22-9190-45111789109B}" destId="{20AE0E32-10DD-47C1-96AD-AF530C66C69F}" srcOrd="4" destOrd="0" parTransId="{BAA467C5-10D8-403F-BA8D-BFCC130A425C}" sibTransId="{3EE5D31C-34CC-4DAD-B4C3-5DD3F7C41B85}"/>
     <dgm:cxn modelId="{1BF672CF-E1A3-4F5D-B648-482844D04C03}" srcId="{A0DAAF04-7AA3-4F22-9190-45111789109B}" destId="{3C9D5C68-6FCA-4A10-980A-33E11658865B}" srcOrd="9" destOrd="0" parTransId="{05C080D9-7998-4F50-8D45-825B25DCD512}" sibTransId="{D212E12E-385E-41E0-B53E-F948B797600D}"/>
@@ -3649,7 +3565,6 @@
     <dgm:cxn modelId="{B994135C-0EC1-4EA0-98A0-C49DAD3B081D}" type="presParOf" srcId="{87195878-9623-4A53-B73A-3510AE5062C5}" destId="{9EB2A054-C719-46C0-9B55-010E4B78980E}" srcOrd="3" destOrd="0" presId="urn:microsoft.com/office/officeart/2005/8/layout/vList2"/>
     <dgm:cxn modelId="{E2906EFB-0CED-4A1A-AAF3-A07A3C15B7B3}" type="presParOf" srcId="{87195878-9623-4A53-B73A-3510AE5062C5}" destId="{920EF786-34AE-4CDF-83CF-7A159AE4B3C9}" srcOrd="4" destOrd="0" presId="urn:microsoft.com/office/officeart/2005/8/layout/vList2"/>
     <dgm:cxn modelId="{8FED8C11-F2BB-45D5-96CD-D9FE03C44E67}" type="presParOf" srcId="{87195878-9623-4A53-B73A-3510AE5062C5}" destId="{07C4600B-39FA-46BA-A953-69A47F2CFAAA}" srcOrd="5" destOrd="0" presId="urn:microsoft.com/office/officeart/2005/8/layout/vList2"/>
-    <dgm:cxn modelId="{2318F9B4-15F5-44D3-BC47-52FC9C2DDABD}" type="presParOf" srcId="{87195878-9623-4A53-B73A-3510AE5062C5}" destId="{A04F6C91-AEBF-4847-980F-C23A5906DCBB}" srcOrd="6" destOrd="0" presId="urn:microsoft.com/office/officeart/2005/8/layout/vList2"/>
   </dgm:cxnLst>
   <dgm:bg>
     <a:solidFill>
@@ -4481,7 +4396,7 @@
       <dsp:spPr>
         <a:xfrm>
           <a:off x="0" y="0"/>
-          <a:ext cx="3088720" cy="260538"/>
+          <a:ext cx="3088720" cy="257513"/>
         </a:xfrm>
         <a:prstGeom prst="roundRect">
           <a:avLst/>
@@ -4551,37 +4466,13 @@
                 </a:schemeClr>
               </a:solidFill>
             </a:rPr>
-            <a:t>Cereali contenenti glutine </a:t>
-          </a:r>
-          <a:r>
-            <a:rPr lang="it-IT" sz="1200" kern="1200">
-              <a:solidFill>
-                <a:schemeClr val="dk1">
-                  <a:hueOff val="0"/>
-                  <a:satOff val="0"/>
-                  <a:lumOff val="0"/>
-                </a:schemeClr>
-              </a:solidFill>
-            </a:rPr>
-            <a:t>e prodotti </a:t>
-          </a:r>
-          <a:r>
-            <a:rPr lang="it-IT" sz="1200" kern="1200" dirty="0">
-              <a:solidFill>
-                <a:schemeClr val="dk1">
-                  <a:hueOff val="0"/>
-                  <a:satOff val="0"/>
-                  <a:lumOff val="0"/>
-                </a:schemeClr>
-              </a:solidFill>
-            </a:rPr>
-            <a:t>derivati</a:t>
+            <a:t>Cereali contenenti glutine e prodotti derivati</a:t>
           </a:r>
         </a:p>
       </dsp:txBody>
       <dsp:txXfrm>
-        <a:off x="12718" y="12718"/>
-        <a:ext cx="3063284" cy="235102"/>
+        <a:off x="12571" y="12571"/>
+        <a:ext cx="3063578" cy="232371"/>
       </dsp:txXfrm>
     </dsp:sp>
     <dsp:sp modelId="{588B54E1-05A8-4440-8F0D-96AD752098A3}">
@@ -4591,8 +4482,8 @@
       </dsp:nvSpPr>
       <dsp:spPr>
         <a:xfrm>
-          <a:off x="0" y="274708"/>
-          <a:ext cx="3088720" cy="260538"/>
+          <a:off x="0" y="272658"/>
+          <a:ext cx="3088720" cy="257513"/>
         </a:xfrm>
         <a:prstGeom prst="roundRect">
           <a:avLst/>
@@ -4659,8 +4550,8 @@
         </a:p>
       </dsp:txBody>
       <dsp:txXfrm>
-        <a:off x="12718" y="287426"/>
-        <a:ext cx="3063284" cy="235102"/>
+        <a:off x="12571" y="285229"/>
+        <a:ext cx="3063578" cy="232371"/>
       </dsp:txXfrm>
     </dsp:sp>
     <dsp:sp modelId="{920EF786-34AE-4CDF-83CF-7A159AE4B3C9}">
@@ -4670,8 +4561,8 @@
       </dsp:nvSpPr>
       <dsp:spPr>
         <a:xfrm>
-          <a:off x="0" y="548074"/>
-          <a:ext cx="3088720" cy="260538"/>
+          <a:off x="0" y="543658"/>
+          <a:ext cx="3088720" cy="257513"/>
         </a:xfrm>
         <a:prstGeom prst="roundRect">
           <a:avLst/>
@@ -4738,8 +4629,8 @@
         </a:p>
       </dsp:txBody>
       <dsp:txXfrm>
-        <a:off x="12718" y="560792"/>
-        <a:ext cx="3063284" cy="235102"/>
+        <a:off x="12571" y="556229"/>
+        <a:ext cx="3063578" cy="232371"/>
       </dsp:txXfrm>
     </dsp:sp>
     <dsp:sp modelId="{07C4600B-39FA-46BA-A953-69A47F2CFAAA}">
@@ -4749,8 +4640,8 @@
       </dsp:nvSpPr>
       <dsp:spPr>
         <a:xfrm>
-          <a:off x="0" y="808612"/>
-          <a:ext cx="3088720" cy="1548802"/>
+          <a:off x="0" y="801172"/>
+          <a:ext cx="3088720" cy="1628533"/>
         </a:xfrm>
         <a:prstGeom prst="rect">
           <a:avLst/>
@@ -5155,91 +5046,8 @@
         </a:p>
       </dsp:txBody>
       <dsp:txXfrm>
-        <a:off x="0" y="808612"/>
-        <a:ext cx="3088720" cy="1548802"/>
-      </dsp:txXfrm>
-    </dsp:sp>
-    <dsp:sp modelId="{A04F6C91-AEBF-4847-980F-C23A5906DCBB}">
-      <dsp:nvSpPr>
-        <dsp:cNvPr id="0" name=""/>
-        <dsp:cNvSpPr/>
-      </dsp:nvSpPr>
-      <dsp:spPr>
-        <a:xfrm>
-          <a:off x="0" y="2358759"/>
-          <a:ext cx="3088720" cy="260538"/>
-        </a:xfrm>
-        <a:prstGeom prst="roundRect">
-          <a:avLst/>
-        </a:prstGeom>
-        <a:solidFill>
-          <a:schemeClr val="accent2">
-            <a:lumMod val="40000"/>
-            <a:lumOff val="60000"/>
-          </a:schemeClr>
-        </a:solidFill>
-        <a:ln w="12700" cap="flat" cmpd="sng" algn="ctr">
-          <a:solidFill>
-            <a:schemeClr val="accent2">
-              <a:shade val="80000"/>
-              <a:hueOff val="0"/>
-              <a:satOff val="0"/>
-              <a:lumOff val="0"/>
-              <a:alphaOff val="0"/>
-            </a:schemeClr>
-          </a:solidFill>
-          <a:prstDash val="solid"/>
-          <a:miter lim="800000"/>
-        </a:ln>
-        <a:effectLst/>
-      </dsp:spPr>
-      <dsp:style>
-        <a:lnRef idx="2">
-          <a:scrgbClr r="0" g="0" b="0"/>
-        </a:lnRef>
-        <a:fillRef idx="1">
-          <a:scrgbClr r="0" g="0" b="0"/>
-        </a:fillRef>
-        <a:effectRef idx="0">
-          <a:scrgbClr r="0" g="0" b="0"/>
-        </a:effectRef>
-        <a:fontRef idx="minor">
-          <a:schemeClr val="lt1"/>
-        </a:fontRef>
-      </dsp:style>
-      <dsp:txBody>
-        <a:bodyPr spcFirstLastPara="0" vert="horz" wrap="square" lIns="45720" tIns="45720" rIns="45720" bIns="45720" numCol="1" spcCol="1270" anchor="ctr" anchorCtr="0">
-          <a:noAutofit/>
-        </a:bodyPr>
-        <a:lstStyle/>
-        <a:p>
-          <a:pPr marL="0" lvl="0" indent="0" algn="l" defTabSz="533400">
-            <a:lnSpc>
-              <a:spcPct val="90000"/>
-            </a:lnSpc>
-            <a:spcBef>
-              <a:spcPct val="0"/>
-            </a:spcBef>
-            <a:spcAft>
-              <a:spcPct val="35000"/>
-            </a:spcAft>
-            <a:buNone/>
-          </a:pPr>
-          <a:r>
-            <a:rPr lang="it-IT" sz="1200" b="1" kern="1200" dirty="0">
-              <a:solidFill>
-                <a:schemeClr val="accent2">
-                  <a:lumMod val="50000"/>
-                </a:schemeClr>
-              </a:solidFill>
-            </a:rPr>
-            <a:t>+ Aggiungi allergene</a:t>
-          </a:r>
-        </a:p>
-      </dsp:txBody>
-      <dsp:txXfrm>
-        <a:off x="12718" y="2371477"/>
-        <a:ext cx="3063284" cy="235102"/>
+        <a:off x="0" y="801172"/>
+        <a:ext cx="3088720" cy="1628533"/>
       </dsp:txXfrm>
     </dsp:sp>
   </dsp:spTree>
@@ -7795,7 +7603,7 @@
           <a:p>
             <a:fld id="{0466A10C-AE68-4E1D-A3DB-DEC87F81CBCA}" type="datetimeFigureOut">
               <a:rPr lang="it-IT" smtClean="0"/>
-              <a:t>06/12/2023</a:t>
+              <a:t>23/01/2024</a:t>
             </a:fld>
             <a:endParaRPr lang="it-IT"/>
           </a:p>
@@ -7993,7 +7801,7 @@
           <a:p>
             <a:fld id="{0466A10C-AE68-4E1D-A3DB-DEC87F81CBCA}" type="datetimeFigureOut">
               <a:rPr lang="it-IT" smtClean="0"/>
-              <a:t>06/12/2023</a:t>
+              <a:t>23/01/2024</a:t>
             </a:fld>
             <a:endParaRPr lang="it-IT"/>
           </a:p>
@@ -8201,7 +8009,7 @@
           <a:p>
             <a:fld id="{0466A10C-AE68-4E1D-A3DB-DEC87F81CBCA}" type="datetimeFigureOut">
               <a:rPr lang="it-IT" smtClean="0"/>
-              <a:t>06/12/2023</a:t>
+              <a:t>23/01/2024</a:t>
             </a:fld>
             <a:endParaRPr lang="it-IT"/>
           </a:p>
@@ -8399,7 +8207,7 @@
           <a:p>
             <a:fld id="{0466A10C-AE68-4E1D-A3DB-DEC87F81CBCA}" type="datetimeFigureOut">
               <a:rPr lang="it-IT" smtClean="0"/>
-              <a:t>06/12/2023</a:t>
+              <a:t>23/01/2024</a:t>
             </a:fld>
             <a:endParaRPr lang="it-IT"/>
           </a:p>
@@ -8674,7 +8482,7 @@
           <a:p>
             <a:fld id="{0466A10C-AE68-4E1D-A3DB-DEC87F81CBCA}" type="datetimeFigureOut">
               <a:rPr lang="it-IT" smtClean="0"/>
-              <a:t>06/12/2023</a:t>
+              <a:t>23/01/2024</a:t>
             </a:fld>
             <a:endParaRPr lang="it-IT"/>
           </a:p>
@@ -8939,7 +8747,7 @@
           <a:p>
             <a:fld id="{0466A10C-AE68-4E1D-A3DB-DEC87F81CBCA}" type="datetimeFigureOut">
               <a:rPr lang="it-IT" smtClean="0"/>
-              <a:t>06/12/2023</a:t>
+              <a:t>23/01/2024</a:t>
             </a:fld>
             <a:endParaRPr lang="it-IT"/>
           </a:p>
@@ -9351,7 +9159,7 @@
           <a:p>
             <a:fld id="{0466A10C-AE68-4E1D-A3DB-DEC87F81CBCA}" type="datetimeFigureOut">
               <a:rPr lang="it-IT" smtClean="0"/>
-              <a:t>06/12/2023</a:t>
+              <a:t>23/01/2024</a:t>
             </a:fld>
             <a:endParaRPr lang="it-IT"/>
           </a:p>
@@ -9492,7 +9300,7 @@
           <a:p>
             <a:fld id="{0466A10C-AE68-4E1D-A3DB-DEC87F81CBCA}" type="datetimeFigureOut">
               <a:rPr lang="it-IT" smtClean="0"/>
-              <a:t>06/12/2023</a:t>
+              <a:t>23/01/2024</a:t>
             </a:fld>
             <a:endParaRPr lang="it-IT"/>
           </a:p>
@@ -9605,7 +9413,7 @@
           <a:p>
             <a:fld id="{0466A10C-AE68-4E1D-A3DB-DEC87F81CBCA}" type="datetimeFigureOut">
               <a:rPr lang="it-IT" smtClean="0"/>
-              <a:t>06/12/2023</a:t>
+              <a:t>23/01/2024</a:t>
             </a:fld>
             <a:endParaRPr lang="it-IT"/>
           </a:p>
@@ -9916,7 +9724,7 @@
           <a:p>
             <a:fld id="{0466A10C-AE68-4E1D-A3DB-DEC87F81CBCA}" type="datetimeFigureOut">
               <a:rPr lang="it-IT" smtClean="0"/>
-              <a:t>06/12/2023</a:t>
+              <a:t>23/01/2024</a:t>
             </a:fld>
             <a:endParaRPr lang="it-IT"/>
           </a:p>
@@ -10204,7 +10012,7 @@
           <a:p>
             <a:fld id="{0466A10C-AE68-4E1D-A3DB-DEC87F81CBCA}" type="datetimeFigureOut">
               <a:rPr lang="it-IT" smtClean="0"/>
-              <a:t>06/12/2023</a:t>
+              <a:t>23/01/2024</a:t>
             </a:fld>
             <a:endParaRPr lang="it-IT"/>
           </a:p>
@@ -10445,7 +10253,7 @@
           <a:p>
             <a:fld id="{0466A10C-AE68-4E1D-A3DB-DEC87F81CBCA}" type="datetimeFigureOut">
               <a:rPr lang="it-IT" smtClean="0"/>
-              <a:t>06/12/2023</a:t>
+              <a:t>23/01/2024</a:t>
             </a:fld>
             <a:endParaRPr lang="it-IT"/>
           </a:p>
@@ -10987,45 +10795,6 @@
           </a:prstGeom>
         </p:spPr>
       </p:pic>
-      <p:sp>
-        <p:nvSpPr>
-          <p:cNvPr id="33" name="CasellaDiTesto 32">
-            <a:extLst>
-              <a:ext uri="{FF2B5EF4-FFF2-40B4-BE49-F238E27FC236}">
-                <a16:creationId xmlns:a16="http://schemas.microsoft.com/office/drawing/2014/main" id="{B8DC760C-A29D-2FFF-94E0-44F0359AF6C5}"/>
-              </a:ext>
-            </a:extLst>
-          </p:cNvPr>
-          <p:cNvSpPr txBox="1"/>
-          <p:nvPr/>
-        </p:nvSpPr>
-        <p:spPr>
-          <a:xfrm>
-            <a:off x="464046" y="1644689"/>
-            <a:ext cx="1733295" cy="461665"/>
-          </a:xfrm>
-          <a:prstGeom prst="rect">
-            <a:avLst/>
-          </a:prstGeom>
-          <a:noFill/>
-        </p:spPr>
-        <p:txBody>
-          <a:bodyPr wrap="none" rtlCol="0">
-            <a:spAutoFit/>
-          </a:bodyPr>
-          <a:lstStyle/>
-          <a:p>
-            <a:r>
-              <a:rPr lang="it-IT" sz="2400" b="1" dirty="0">
-                <a:solidFill>
-                  <a:schemeClr val="accent2"/>
-                </a:solidFill>
-              </a:rPr>
-              <a:t>Il mio piatto</a:t>
-            </a:r>
-          </a:p>
-        </p:txBody>
-      </p:sp>
       <p:grpSp>
         <p:nvGrpSpPr>
           <p:cNvPr id="22" name="Gruppo 21">
@@ -12156,47 +11925,107 @@
           </p:txBody>
         </p:sp>
       </p:grpSp>
-      <p:sp>
-        <p:nvSpPr>
-          <p:cNvPr id="119" name="CasellaDiTesto 118">
+      <p:grpSp>
+        <p:nvGrpSpPr>
+          <p:cNvPr id="2" name="Gruppo 1">
             <a:extLst>
               <a:ext uri="{FF2B5EF4-FFF2-40B4-BE49-F238E27FC236}">
-                <a16:creationId xmlns:a16="http://schemas.microsoft.com/office/drawing/2014/main" id="{F0C58AB8-0709-194D-1C1C-03A0AD727E20}"/>
+                <a16:creationId xmlns:a16="http://schemas.microsoft.com/office/drawing/2014/main" id="{B18EEC3C-7958-B179-1FA8-79DF7AB5C69D}"/>
               </a:ext>
             </a:extLst>
           </p:cNvPr>
-          <p:cNvSpPr txBox="1"/>
+          <p:cNvGrpSpPr/>
           <p:nvPr/>
-        </p:nvSpPr>
-        <p:spPr>
+        </p:nvGrpSpPr>
+        <p:grpSpPr>
           <a:xfrm>
-            <a:off x="464046" y="1298412"/>
-            <a:ext cx="2914452" cy="523220"/>
+            <a:off x="444996" y="911062"/>
+            <a:ext cx="2914452" cy="807942"/>
+            <a:chOff x="464046" y="1298412"/>
+            <a:chExt cx="2914452" cy="807942"/>
           </a:xfrm>
-          <a:prstGeom prst="rect">
-            <a:avLst/>
-          </a:prstGeom>
-          <a:noFill/>
-        </p:spPr>
-        <p:txBody>
-          <a:bodyPr wrap="none" rtlCol="0">
-            <a:spAutoFit/>
-          </a:bodyPr>
-          <a:lstStyle/>
-          <a:p>
-            <a:r>
-              <a:rPr lang="it-IT" sz="2800" b="1" dirty="0">
-                <a:solidFill>
-                  <a:schemeClr val="accent2">
-                    <a:lumMod val="50000"/>
-                  </a:schemeClr>
-                </a:solidFill>
-              </a:rPr>
-              <a:t>Aggiungi un piatto</a:t>
-            </a:r>
-          </a:p>
-        </p:txBody>
-      </p:sp>
+        </p:grpSpPr>
+        <p:sp>
+          <p:nvSpPr>
+            <p:cNvPr id="33" name="CasellaDiTesto 32">
+              <a:extLst>
+                <a:ext uri="{FF2B5EF4-FFF2-40B4-BE49-F238E27FC236}">
+                  <a16:creationId xmlns:a16="http://schemas.microsoft.com/office/drawing/2014/main" id="{B8DC760C-A29D-2FFF-94E0-44F0359AF6C5}"/>
+                </a:ext>
+              </a:extLst>
+            </p:cNvPr>
+            <p:cNvSpPr txBox="1"/>
+            <p:nvPr/>
+          </p:nvSpPr>
+          <p:spPr>
+            <a:xfrm>
+              <a:off x="464046" y="1644689"/>
+              <a:ext cx="1733295" cy="461665"/>
+            </a:xfrm>
+            <a:prstGeom prst="rect">
+              <a:avLst/>
+            </a:prstGeom>
+            <a:noFill/>
+          </p:spPr>
+          <p:txBody>
+            <a:bodyPr wrap="none" rtlCol="0">
+              <a:spAutoFit/>
+            </a:bodyPr>
+            <a:lstStyle/>
+            <a:p>
+              <a:r>
+                <a:rPr lang="it-IT" sz="2400" b="1" dirty="0">
+                  <a:solidFill>
+                    <a:schemeClr val="accent2"/>
+                  </a:solidFill>
+                </a:rPr>
+                <a:t>Il mio piatto</a:t>
+              </a:r>
+            </a:p>
+          </p:txBody>
+        </p:sp>
+        <p:sp>
+          <p:nvSpPr>
+            <p:cNvPr id="119" name="CasellaDiTesto 118">
+              <a:extLst>
+                <a:ext uri="{FF2B5EF4-FFF2-40B4-BE49-F238E27FC236}">
+                  <a16:creationId xmlns:a16="http://schemas.microsoft.com/office/drawing/2014/main" id="{F0C58AB8-0709-194D-1C1C-03A0AD727E20}"/>
+                </a:ext>
+              </a:extLst>
+            </p:cNvPr>
+            <p:cNvSpPr txBox="1"/>
+            <p:nvPr/>
+          </p:nvSpPr>
+          <p:spPr>
+            <a:xfrm>
+              <a:off x="464046" y="1298412"/>
+              <a:ext cx="2914452" cy="523220"/>
+            </a:xfrm>
+            <a:prstGeom prst="rect">
+              <a:avLst/>
+            </a:prstGeom>
+            <a:noFill/>
+          </p:spPr>
+          <p:txBody>
+            <a:bodyPr wrap="none" rtlCol="0">
+              <a:spAutoFit/>
+            </a:bodyPr>
+            <a:lstStyle/>
+            <a:p>
+              <a:r>
+                <a:rPr lang="it-IT" sz="2800" b="1" dirty="0">
+                  <a:solidFill>
+                    <a:schemeClr val="accent2">
+                      <a:lumMod val="50000"/>
+                    </a:schemeClr>
+                  </a:solidFill>
+                </a:rPr>
+                <a:t>Aggiungi un piatto</a:t>
+              </a:r>
+            </a:p>
+          </p:txBody>
+        </p:sp>
+      </p:grpSp>
       <p:grpSp>
         <p:nvGrpSpPr>
           <p:cNvPr id="144" name="Gruppo 143">
@@ -12211,7 +12040,7 @@
         </p:nvGrpSpPr>
         <p:grpSpPr>
           <a:xfrm>
-            <a:off x="104858" y="1081303"/>
+            <a:off x="545253" y="1689247"/>
             <a:ext cx="959836" cy="307777"/>
             <a:chOff x="573401" y="6231721"/>
             <a:chExt cx="959836" cy="307777"/>
@@ -15307,14 +15136,14 @@
             <p:nvPr>
               <p:extLst>
                 <p:ext uri="{D42A27DB-BD31-4B8C-83A1-F6EECF244321}">
-                  <p14:modId xmlns:p14="http://schemas.microsoft.com/office/powerpoint/2010/main" val="3481151264"/>
+                  <p14:modId xmlns:p14="http://schemas.microsoft.com/office/powerpoint/2010/main" val="4170552745"/>
                 </p:ext>
               </p:extLst>
             </p:nvPr>
           </p:nvGraphicFramePr>
           <p:xfrm>
-            <a:off x="750028" y="3434828"/>
-            <a:ext cx="3088720" cy="2619298"/>
+            <a:off x="722718" y="3428726"/>
+            <a:ext cx="3088720" cy="2431363"/>
           </p:xfrm>
           <a:graphic>
             <a:graphicData uri="http://schemas.openxmlformats.org/drawingml/2006/diagram">
@@ -15322,161 +15151,6 @@
             </a:graphicData>
           </a:graphic>
         </p:graphicFrame>
-        <p:cxnSp>
-          <p:nvCxnSpPr>
-            <p:cNvPr id="70" name="Connettore diritto 69">
-              <a:extLst>
-                <a:ext uri="{FF2B5EF4-FFF2-40B4-BE49-F238E27FC236}">
-                  <a16:creationId xmlns:a16="http://schemas.microsoft.com/office/drawing/2014/main" id="{C18E5F93-E4C3-A31D-9942-452A2EC099BF}"/>
-                </a:ext>
-              </a:extLst>
-            </p:cNvPr>
-            <p:cNvCxnSpPr>
-              <a:cxnSpLocks/>
-            </p:cNvCxnSpPr>
-            <p:nvPr/>
-          </p:nvCxnSpPr>
-          <p:spPr>
-            <a:xfrm flipV="1">
-              <a:off x="595339" y="5747187"/>
-              <a:ext cx="3525811" cy="6894"/>
-            </a:xfrm>
-            <a:prstGeom prst="line">
-              <a:avLst/>
-            </a:prstGeom>
-          </p:spPr>
-          <p:style>
-            <a:lnRef idx="1">
-              <a:schemeClr val="accent3"/>
-            </a:lnRef>
-            <a:fillRef idx="0">
-              <a:schemeClr val="accent3"/>
-            </a:fillRef>
-            <a:effectRef idx="0">
-              <a:schemeClr val="accent3"/>
-            </a:effectRef>
-            <a:fontRef idx="minor">
-              <a:schemeClr val="tx1"/>
-            </a:fontRef>
-          </p:style>
-        </p:cxnSp>
-        <p:pic>
-          <p:nvPicPr>
-            <p:cNvPr id="71" name="Elemento grafico 70" descr="Chiudi con riempimento a tinta unita">
-              <a:extLst>
-                <a:ext uri="{FF2B5EF4-FFF2-40B4-BE49-F238E27FC236}">
-                  <a16:creationId xmlns:a16="http://schemas.microsoft.com/office/drawing/2014/main" id="{71FC2E1C-48BA-E4F4-3F7B-72733BD144AA}"/>
-                </a:ext>
-              </a:extLst>
-            </p:cNvPr>
-            <p:cNvPicPr>
-              <a:picLocks noChangeAspect="1"/>
-            </p:cNvPicPr>
-            <p:nvPr/>
-          </p:nvPicPr>
-          <p:blipFill>
-            <a:blip r:embed="rId15">
-              <a:extLst>
-                <a:ext uri="{28A0092B-C50C-407E-A947-70E740481C1C}">
-                  <a14:useLocalDpi xmlns:a14="http://schemas.microsoft.com/office/drawing/2010/main" val="0"/>
-                </a:ext>
-                <a:ext uri="{96DAC541-7B7A-43D3-8B79-37D633B846F1}">
-                  <asvg:svgBlip xmlns:asvg="http://schemas.microsoft.com/office/drawing/2016/SVG/main" r:embed="rId16"/>
-                </a:ext>
-              </a:extLst>
-            </a:blip>
-            <a:stretch>
-              <a:fillRect/>
-            </a:stretch>
-          </p:blipFill>
-          <p:spPr>
-            <a:xfrm>
-              <a:off x="3582291" y="3736234"/>
-              <a:ext cx="199306" cy="199306"/>
-            </a:xfrm>
-            <a:prstGeom prst="rect">
-              <a:avLst/>
-            </a:prstGeom>
-          </p:spPr>
-        </p:pic>
-        <p:pic>
-          <p:nvPicPr>
-            <p:cNvPr id="72" name="Elemento grafico 71" descr="Chiudi con riempimento a tinta unita">
-              <a:extLst>
-                <a:ext uri="{FF2B5EF4-FFF2-40B4-BE49-F238E27FC236}">
-                  <a16:creationId xmlns:a16="http://schemas.microsoft.com/office/drawing/2014/main" id="{55B8358C-990B-1146-8F79-8555B731643F}"/>
-                </a:ext>
-              </a:extLst>
-            </p:cNvPr>
-            <p:cNvPicPr>
-              <a:picLocks noChangeAspect="1"/>
-            </p:cNvPicPr>
-            <p:nvPr/>
-          </p:nvPicPr>
-          <p:blipFill>
-            <a:blip r:embed="rId15">
-              <a:extLst>
-                <a:ext uri="{28A0092B-C50C-407E-A947-70E740481C1C}">
-                  <a14:useLocalDpi xmlns:a14="http://schemas.microsoft.com/office/drawing/2010/main" val="0"/>
-                </a:ext>
-                <a:ext uri="{96DAC541-7B7A-43D3-8B79-37D633B846F1}">
-                  <asvg:svgBlip xmlns:asvg="http://schemas.microsoft.com/office/drawing/2016/SVG/main" r:embed="rId16"/>
-                </a:ext>
-              </a:extLst>
-            </a:blip>
-            <a:stretch>
-              <a:fillRect/>
-            </a:stretch>
-          </p:blipFill>
-          <p:spPr>
-            <a:xfrm>
-              <a:off x="3582291" y="3465167"/>
-              <a:ext cx="199306" cy="199306"/>
-            </a:xfrm>
-            <a:prstGeom prst="rect">
-              <a:avLst/>
-            </a:prstGeom>
-          </p:spPr>
-        </p:pic>
-        <p:pic>
-          <p:nvPicPr>
-            <p:cNvPr id="73" name="Elemento grafico 72" descr="Chiudi con riempimento a tinta unita">
-              <a:extLst>
-                <a:ext uri="{FF2B5EF4-FFF2-40B4-BE49-F238E27FC236}">
-                  <a16:creationId xmlns:a16="http://schemas.microsoft.com/office/drawing/2014/main" id="{B79C0A52-9FC6-820E-9898-EA4801857F32}"/>
-                </a:ext>
-              </a:extLst>
-            </p:cNvPr>
-            <p:cNvPicPr>
-              <a:picLocks noChangeAspect="1"/>
-            </p:cNvPicPr>
-            <p:nvPr/>
-          </p:nvPicPr>
-          <p:blipFill>
-            <a:blip r:embed="rId15">
-              <a:extLst>
-                <a:ext uri="{28A0092B-C50C-407E-A947-70E740481C1C}">
-                  <a14:useLocalDpi xmlns:a14="http://schemas.microsoft.com/office/drawing/2010/main" val="0"/>
-                </a:ext>
-                <a:ext uri="{96DAC541-7B7A-43D3-8B79-37D633B846F1}">
-                  <asvg:svgBlip xmlns:asvg="http://schemas.microsoft.com/office/drawing/2016/SVG/main" r:embed="rId16"/>
-                </a:ext>
-              </a:extLst>
-            </a:blip>
-            <a:stretch>
-              <a:fillRect/>
-            </a:stretch>
-          </p:blipFill>
-          <p:spPr>
-            <a:xfrm>
-              <a:off x="3582291" y="4006772"/>
-              <a:ext cx="199306" cy="199306"/>
-            </a:xfrm>
-            <a:prstGeom prst="rect">
-              <a:avLst/>
-            </a:prstGeom>
-          </p:spPr>
-        </p:pic>
         <p:sp>
           <p:nvSpPr>
             <p:cNvPr id="78" name="Rettangolo 77">
@@ -15491,7 +15165,7 @@
           </p:nvSpPr>
           <p:spPr>
             <a:xfrm rot="5400000">
-              <a:off x="2285744" y="3895237"/>
+              <a:off x="2285744" y="4251346"/>
               <a:ext cx="184726" cy="3408926"/>
             </a:xfrm>
             <a:prstGeom prst="rect">
@@ -15647,7 +15321,7 @@
           </p:nvSpPr>
           <p:spPr>
             <a:xfrm rot="10800000">
-              <a:off x="2285388" y="5561532"/>
+              <a:off x="2285388" y="5917641"/>
               <a:ext cx="145709" cy="84031"/>
             </a:xfrm>
             <a:prstGeom prst="triangle">
@@ -15771,6 +15445,45 @@
           </a:p>
         </p:txBody>
       </p:sp>
+      <p:pic>
+        <p:nvPicPr>
+          <p:cNvPr id="26" name="Elemento grafico 25" descr="Segno di spunta con riempimento a tinta unita">
+            <a:extLst>
+              <a:ext uri="{FF2B5EF4-FFF2-40B4-BE49-F238E27FC236}">
+                <a16:creationId xmlns:a16="http://schemas.microsoft.com/office/drawing/2014/main" id="{AE844BEB-33D2-7CF4-8D25-E18E7538FA3D}"/>
+              </a:ext>
+            </a:extLst>
+          </p:cNvPr>
+          <p:cNvPicPr>
+            <a:picLocks noChangeAspect="1"/>
+          </p:cNvPicPr>
+          <p:nvPr/>
+        </p:nvPicPr>
+        <p:blipFill>
+          <a:blip r:embed="rId22">
+            <a:extLst>
+              <a:ext uri="{28A0092B-C50C-407E-A947-70E740481C1C}">
+                <a14:useLocalDpi xmlns:a14="http://schemas.microsoft.com/office/drawing/2010/main" val="0"/>
+              </a:ext>
+              <a:ext uri="{96DAC541-7B7A-43D3-8B79-37D633B846F1}">
+                <asvg:svgBlip xmlns:asvg="http://schemas.microsoft.com/office/drawing/2016/SVG/main" r:embed="rId23"/>
+              </a:ext>
+            </a:extLst>
+          </a:blip>
+          <a:stretch>
+            <a:fillRect/>
+          </a:stretch>
+        </p:blipFill>
+        <p:spPr>
+          <a:xfrm>
+            <a:off x="915130" y="5680771"/>
+            <a:ext cx="102806" cy="102806"/>
+          </a:xfrm>
+          <a:prstGeom prst="rect">
+            <a:avLst/>
+          </a:prstGeom>
+        </p:spPr>
+      </p:pic>
     </p:spTree>
     <p:extLst>
       <p:ext uri="{BB962C8B-B14F-4D97-AF65-F5344CB8AC3E}">

</xml_diff>